<commit_message>
Fix lại xong slide.
</commit_message>
<xml_diff>
--- a/Document/Slide/Slide thuyet trinh.pptx
+++ b/Document/Slide/Slide thuyet trinh.pptx
@@ -16,10 +16,12 @@
     <p:sldId id="265" r:id="rId10"/>
     <p:sldId id="266" r:id="rId11"/>
     <p:sldId id="271" r:id="rId12"/>
-    <p:sldId id="259" r:id="rId13"/>
-    <p:sldId id="260" r:id="rId14"/>
-    <p:sldId id="261" r:id="rId15"/>
-    <p:sldId id="270" r:id="rId16"/>
+    <p:sldId id="272" r:id="rId13"/>
+    <p:sldId id="273" r:id="rId14"/>
+    <p:sldId id="259" r:id="rId15"/>
+    <p:sldId id="260" r:id="rId16"/>
+    <p:sldId id="261" r:id="rId17"/>
+    <p:sldId id="270" r:id="rId18"/>
   </p:sldIdLst>
   <p:sldSz cx="9144000" cy="6858000" type="screen4x3"/>
   <p:notesSz cx="6858000" cy="9144000"/>
@@ -8853,6 +8855,13 @@
         </dgm:presLayoutVars>
       </dgm:prSet>
       <dgm:spPr/>
+      <dgm:t>
+        <a:bodyPr/>
+        <a:lstStyle/>
+        <a:p>
+          <a:endParaRPr lang="en-US"/>
+        </a:p>
+      </dgm:t>
     </dgm:pt>
     <dgm:pt modelId="{45669B3E-2965-448C-8805-4C7DC4E0DC44}" type="pres">
       <dgm:prSet presAssocID="{65B0E107-D46F-4B82-BB87-20584109D6DD}" presName="composite" presStyleCnt="0"/>
@@ -8920,6 +8929,13 @@
         </dgm:presLayoutVars>
       </dgm:prSet>
       <dgm:spPr/>
+      <dgm:t>
+        <a:bodyPr/>
+        <a:lstStyle/>
+        <a:p>
+          <a:endParaRPr lang="en-US"/>
+        </a:p>
+      </dgm:t>
     </dgm:pt>
     <dgm:pt modelId="{5301A875-0C80-4E9C-BC89-78ED7999657B}" type="pres">
       <dgm:prSet presAssocID="{6FD9A031-F91E-4BD0-B99B-143A7A69FCFF}" presName="Image" presStyleLbl="bgImgPlace1" presStyleIdx="1" presStyleCnt="6"/>
@@ -8966,6 +8982,13 @@
         </dgm:presLayoutVars>
       </dgm:prSet>
       <dgm:spPr/>
+      <dgm:t>
+        <a:bodyPr/>
+        <a:lstStyle/>
+        <a:p>
+          <a:endParaRPr lang="en-US"/>
+        </a:p>
+      </dgm:t>
     </dgm:pt>
     <dgm:pt modelId="{F4D8AAA2-CB46-47F9-A5AF-76286857F1A3}" type="pres">
       <dgm:prSet presAssocID="{28F00DE3-3138-4A84-AB6C-7A2D47C39FAF}" presName="Image" presStyleLbl="bgImgPlace1" presStyleIdx="2" presStyleCnt="6"/>
@@ -9012,6 +9035,13 @@
         </dgm:presLayoutVars>
       </dgm:prSet>
       <dgm:spPr/>
+      <dgm:t>
+        <a:bodyPr/>
+        <a:lstStyle/>
+        <a:p>
+          <a:endParaRPr lang="en-US"/>
+        </a:p>
+      </dgm:t>
     </dgm:pt>
     <dgm:pt modelId="{270D6350-6A24-4121-919B-05A18501008F}" type="pres">
       <dgm:prSet presAssocID="{48EBE2A9-13B6-42B3-8A4C-12D9BB8EF7B9}" presName="Image" presStyleLbl="bgImgPlace1" presStyleIdx="3" presStyleCnt="6"/>
@@ -9111,6 +9141,13 @@
         </dgm:presLayoutVars>
       </dgm:prSet>
       <dgm:spPr/>
+      <dgm:t>
+        <a:bodyPr/>
+        <a:lstStyle/>
+        <a:p>
+          <a:endParaRPr lang="en-US"/>
+        </a:p>
+      </dgm:t>
     </dgm:pt>
     <dgm:pt modelId="{62A011AB-7AA5-4020-AA0E-36B9CF6570CF}" type="pres">
       <dgm:prSet presAssocID="{6646BF65-6D17-43EC-89B7-AB1B38538A2F}" presName="Image" presStyleLbl="bgImgPlace1" presStyleIdx="5" presStyleCnt="6"/>
@@ -9142,19 +9179,19 @@
     </dgm:pt>
   </dgm:ptLst>
   <dgm:cxnLst>
-    <dgm:cxn modelId="{7FD1D5FC-D5B7-4A36-AC6C-6F1A317165BC}" type="presOf" srcId="{48EBE2A9-13B6-42B3-8A4C-12D9BB8EF7B9}" destId="{62D04514-2B3E-4ABB-81DA-54544BE0E781}" srcOrd="0" destOrd="0" presId="urn:microsoft.com/office/officeart/2008/layout/TitledPictureBlocks"/>
+    <dgm:cxn modelId="{28FDAAF5-A753-4936-8CD1-249184182935}" srcId="{C68964CA-0DC4-464C-8742-EA8C11F645E3}" destId="{65B0E107-D46F-4B82-BB87-20584109D6DD}" srcOrd="0" destOrd="0" parTransId="{0AD2C18E-50B6-4FF8-A9F9-9F4B4D3A4B3D}" sibTransId="{1C34A964-BBA6-45D5-9225-916C3C86EE88}"/>
     <dgm:cxn modelId="{E70BB69C-35CE-4598-B12F-5AA7550AD51D}" srcId="{C68964CA-0DC4-464C-8742-EA8C11F645E3}" destId="{6646BF65-6D17-43EC-89B7-AB1B38538A2F}" srcOrd="5" destOrd="0" parTransId="{3928CB9A-442E-4005-934F-CA14B8F62120}" sibTransId="{4DA50809-3995-4329-8A86-243B230DD0BC}"/>
     <dgm:cxn modelId="{CE8F8032-AACC-47AA-AB07-0FCC2BC823C7}" type="presOf" srcId="{65B0E107-D46F-4B82-BB87-20584109D6DD}" destId="{B89E11BF-2772-4C02-804D-147A17FE4410}" srcOrd="0" destOrd="0" presId="urn:microsoft.com/office/officeart/2008/layout/TitledPictureBlocks"/>
+    <dgm:cxn modelId="{CBA251DC-DE6F-42ED-802A-0543B57C7603}" type="presOf" srcId="{C68964CA-0DC4-464C-8742-EA8C11F645E3}" destId="{91EEC5B4-AF4C-4F11-B1FC-C9770F51EED6}" srcOrd="0" destOrd="0" presId="urn:microsoft.com/office/officeart/2008/layout/TitledPictureBlocks"/>
+    <dgm:cxn modelId="{C9E09CB4-0F8F-416F-A1F9-F019506D7640}" type="presOf" srcId="{6646BF65-6D17-43EC-89B7-AB1B38538A2F}" destId="{B2F6AE39-1FDE-4B25-B7CE-3AE708C78F89}" srcOrd="0" destOrd="0" presId="urn:microsoft.com/office/officeart/2008/layout/TitledPictureBlocks"/>
+    <dgm:cxn modelId="{46FF2D09-61F2-4634-860A-E0D4A122BCCA}" srcId="{C68964CA-0DC4-464C-8742-EA8C11F645E3}" destId="{1031E562-6A3B-4133-B5A1-8287FF7DA30D}" srcOrd="4" destOrd="0" parTransId="{86DA4308-443F-4C85-8557-B5A9F612A1B3}" sibTransId="{922CC0F5-48AD-46C9-8DC6-BAEEB66E6DE0}"/>
+    <dgm:cxn modelId="{D9F12A46-1B1B-478F-BB44-2E480781F249}" type="presOf" srcId="{28F00DE3-3138-4A84-AB6C-7A2D47C39FAF}" destId="{7EF7CE15-F744-422C-94D8-B5D329D57366}" srcOrd="0" destOrd="0" presId="urn:microsoft.com/office/officeart/2008/layout/TitledPictureBlocks"/>
+    <dgm:cxn modelId="{407D3424-AD9D-47A4-A425-6A0CD2E58C1B}" type="presOf" srcId="{1031E562-6A3B-4133-B5A1-8287FF7DA30D}" destId="{88896D69-89D9-4305-BB73-F4D05A6B5902}" srcOrd="0" destOrd="0" presId="urn:microsoft.com/office/officeart/2008/layout/TitledPictureBlocks"/>
     <dgm:cxn modelId="{FC18BD6C-4D82-4F43-8611-5EBFA45537D1}" srcId="{C68964CA-0DC4-464C-8742-EA8C11F645E3}" destId="{28F00DE3-3138-4A84-AB6C-7A2D47C39FAF}" srcOrd="2" destOrd="0" parTransId="{1C256EFE-F000-4E02-851E-3981B91ABA69}" sibTransId="{DB441D25-001E-4451-9214-7B26D57744E8}"/>
     <dgm:cxn modelId="{1F22653A-962D-4FAC-8374-FBD7F5689742}" srcId="{C68964CA-0DC4-464C-8742-EA8C11F645E3}" destId="{6FD9A031-F91E-4BD0-B99B-143A7A69FCFF}" srcOrd="1" destOrd="0" parTransId="{58D925B6-40E4-47A1-9DD3-48B742C428CB}" sibTransId="{B2DD9C8F-1ED8-4003-B54B-71D1CCD14E34}"/>
-    <dgm:cxn modelId="{C9E09CB4-0F8F-416F-A1F9-F019506D7640}" type="presOf" srcId="{6646BF65-6D17-43EC-89B7-AB1B38538A2F}" destId="{B2F6AE39-1FDE-4B25-B7CE-3AE708C78F89}" srcOrd="0" destOrd="0" presId="urn:microsoft.com/office/officeart/2008/layout/TitledPictureBlocks"/>
+    <dgm:cxn modelId="{C2D76C94-F34D-4AF8-8107-C2B855906F1E}" srcId="{C68964CA-0DC4-464C-8742-EA8C11F645E3}" destId="{48EBE2A9-13B6-42B3-8A4C-12D9BB8EF7B9}" srcOrd="3" destOrd="0" parTransId="{ECAFBF6D-DC82-4C19-9451-4C1A7E341FD3}" sibTransId="{CAE4BEF0-BD73-4E49-B051-78AEC1F61D1A}"/>
+    <dgm:cxn modelId="{7FD1D5FC-D5B7-4A36-AC6C-6F1A317165BC}" type="presOf" srcId="{48EBE2A9-13B6-42B3-8A4C-12D9BB8EF7B9}" destId="{62D04514-2B3E-4ABB-81DA-54544BE0E781}" srcOrd="0" destOrd="0" presId="urn:microsoft.com/office/officeart/2008/layout/TitledPictureBlocks"/>
     <dgm:cxn modelId="{4FF9C53D-C5C7-4AB8-BF00-804990C9745C}" type="presOf" srcId="{6FD9A031-F91E-4BD0-B99B-143A7A69FCFF}" destId="{8C116A9B-1CBA-4975-9BCC-C9FE4F933606}" srcOrd="0" destOrd="0" presId="urn:microsoft.com/office/officeart/2008/layout/TitledPictureBlocks"/>
-    <dgm:cxn modelId="{D9F12A46-1B1B-478F-BB44-2E480781F249}" type="presOf" srcId="{28F00DE3-3138-4A84-AB6C-7A2D47C39FAF}" destId="{7EF7CE15-F744-422C-94D8-B5D329D57366}" srcOrd="0" destOrd="0" presId="urn:microsoft.com/office/officeart/2008/layout/TitledPictureBlocks"/>
-    <dgm:cxn modelId="{CBA251DC-DE6F-42ED-802A-0543B57C7603}" type="presOf" srcId="{C68964CA-0DC4-464C-8742-EA8C11F645E3}" destId="{91EEC5B4-AF4C-4F11-B1FC-C9770F51EED6}" srcOrd="0" destOrd="0" presId="urn:microsoft.com/office/officeart/2008/layout/TitledPictureBlocks"/>
-    <dgm:cxn modelId="{28FDAAF5-A753-4936-8CD1-249184182935}" srcId="{C68964CA-0DC4-464C-8742-EA8C11F645E3}" destId="{65B0E107-D46F-4B82-BB87-20584109D6DD}" srcOrd="0" destOrd="0" parTransId="{0AD2C18E-50B6-4FF8-A9F9-9F4B4D3A4B3D}" sibTransId="{1C34A964-BBA6-45D5-9225-916C3C86EE88}"/>
-    <dgm:cxn modelId="{C2D76C94-F34D-4AF8-8107-C2B855906F1E}" srcId="{C68964CA-0DC4-464C-8742-EA8C11F645E3}" destId="{48EBE2A9-13B6-42B3-8A4C-12D9BB8EF7B9}" srcOrd="3" destOrd="0" parTransId="{ECAFBF6D-DC82-4C19-9451-4C1A7E341FD3}" sibTransId="{CAE4BEF0-BD73-4E49-B051-78AEC1F61D1A}"/>
-    <dgm:cxn modelId="{407D3424-AD9D-47A4-A425-6A0CD2E58C1B}" type="presOf" srcId="{1031E562-6A3B-4133-B5A1-8287FF7DA30D}" destId="{88896D69-89D9-4305-BB73-F4D05A6B5902}" srcOrd="0" destOrd="0" presId="urn:microsoft.com/office/officeart/2008/layout/TitledPictureBlocks"/>
-    <dgm:cxn modelId="{46FF2D09-61F2-4634-860A-E0D4A122BCCA}" srcId="{C68964CA-0DC4-464C-8742-EA8C11F645E3}" destId="{1031E562-6A3B-4133-B5A1-8287FF7DA30D}" srcOrd="4" destOrd="0" parTransId="{86DA4308-443F-4C85-8557-B5A9F612A1B3}" sibTransId="{922CC0F5-48AD-46C9-8DC6-BAEEB66E6DE0}"/>
     <dgm:cxn modelId="{2386715B-040E-496E-972B-867FEAFA4462}" type="presParOf" srcId="{91EEC5B4-AF4C-4F11-B1FC-C9770F51EED6}" destId="{45669B3E-2965-448C-8805-4C7DC4E0DC44}" srcOrd="0" destOrd="0" presId="urn:microsoft.com/office/officeart/2008/layout/TitledPictureBlocks"/>
     <dgm:cxn modelId="{EB406E68-67A1-42B4-AC83-8B3AAFCDFBFB}" type="presParOf" srcId="{45669B3E-2965-448C-8805-4C7DC4E0DC44}" destId="{B89E11BF-2772-4C02-804D-147A17FE4410}" srcOrd="0" destOrd="0" presId="urn:microsoft.com/office/officeart/2008/layout/TitledPictureBlocks"/>
     <dgm:cxn modelId="{E714DFC6-A1D1-45DC-849C-B35734BE8755}" type="presParOf" srcId="{45669B3E-2965-448C-8805-4C7DC4E0DC44}" destId="{297FC975-E460-4C87-B9F0-D39E33652F68}" srcOrd="1" destOrd="0" presId="urn:microsoft.com/office/officeart/2008/layout/TitledPictureBlocks"/>
@@ -9254,12 +9291,19 @@
         <a:lstStyle/>
         <a:p>
           <a:r>
-            <a:rPr lang="en-US" sz="1700" smtClean="0"/>
+            <a:rPr lang="en-US" sz="1700" b="1" smtClean="0"/>
             <a:t>Check Attendance by Taking Picture</a:t>
           </a:r>
-          <a:endParaRPr lang="en-US" sz="1700"/>
+          <a:endParaRPr lang="en-US" sz="1700" b="1"/>
         </a:p>
       </dgm:t>
+      <dgm:extLst>
+        <a:ext uri="{E40237B7-FDA0-4F09-8148-C483321AD2D9}">
+          <dgm14:cNvPr xmlns:dgm14="http://schemas.microsoft.com/office/drawing/2010/diagram" id="0" name="">
+            <a:hlinkClick xmlns:r="http://schemas.openxmlformats.org/officeDocument/2006/relationships" r:id="rId1" action="ppaction://hlinksldjump"/>
+          </dgm14:cNvPr>
+        </a:ext>
+      </dgm:extLst>
     </dgm:pt>
     <dgm:pt modelId="{C6C5B711-A868-4D69-A115-108F2806A453}" type="parTrans" cxnId="{4336A06D-0299-42FD-8FA4-4ABF38452E81}">
       <dgm:prSet/>
@@ -9291,16 +9335,16 @@
         <a:lstStyle/>
         <a:p>
           <a:r>
-            <a:rPr lang="en-US" sz="1700" smtClean="0"/>
+            <a:rPr lang="en-US" sz="1700" b="1" smtClean="0"/>
             <a:t>Check Attendance Manually</a:t>
           </a:r>
         </a:p>
         <a:p>
           <a:r>
-            <a:rPr lang="en-US" sz="1700" smtClean="0"/>
+            <a:rPr lang="en-US" sz="1700" b="1" smtClean="0"/>
             <a:t>(Web &amp; Mobile)</a:t>
           </a:r>
-          <a:endParaRPr lang="en-US" sz="1700"/>
+          <a:endParaRPr lang="en-US" sz="1700" b="1"/>
         </a:p>
       </dgm:t>
     </dgm:pt>
@@ -9334,12 +9378,19 @@
         <a:lstStyle/>
         <a:p>
           <a:r>
-            <a:rPr lang="en-US" sz="1700" smtClean="0"/>
+            <a:rPr lang="en-US" sz="1700" b="1" smtClean="0"/>
             <a:t>Check Attendance Offline &amp; Sync Data Online</a:t>
           </a:r>
-          <a:endParaRPr lang="en-US" sz="1700"/>
+          <a:endParaRPr lang="en-US" sz="1700" b="1"/>
         </a:p>
       </dgm:t>
+      <dgm:extLst>
+        <a:ext uri="{E40237B7-FDA0-4F09-8148-C483321AD2D9}">
+          <dgm14:cNvPr xmlns:dgm14="http://schemas.microsoft.com/office/drawing/2010/diagram" id="0" name="">
+            <a:hlinkClick xmlns:r="http://schemas.openxmlformats.org/officeDocument/2006/relationships" r:id="rId2" action="ppaction://hlinksldjump"/>
+          </dgm14:cNvPr>
+        </a:ext>
+      </dgm:extLst>
     </dgm:pt>
     <dgm:pt modelId="{1357CFAE-0126-4C3A-A7B1-C5AF62CABAE5}" type="parTrans" cxnId="{8A36D92D-2BA0-4A5F-9DCA-1DB93D939863}">
       <dgm:prSet/>
@@ -9371,10 +9422,10 @@
         <a:lstStyle/>
         <a:p>
           <a:r>
-            <a:rPr lang="en-US" sz="1700" smtClean="0"/>
+            <a:rPr lang="en-US" sz="1700" b="1" smtClean="0"/>
             <a:t>Export Excel Report (Instructor &amp; Staff) </a:t>
           </a:r>
-          <a:endParaRPr lang="en-US" sz="1700"/>
+          <a:endParaRPr lang="en-US" sz="1700" b="1"/>
         </a:p>
       </dgm:t>
     </dgm:pt>
@@ -9409,7 +9460,7 @@
         <a:p>
           <a:r>
             <a:rPr lang="en-US" sz="1700" smtClean="0"/>
-            <a:t>Add Student Image into System (Upload Images, use Log)</a:t>
+            <a:t>Manage Study Session. Sync Calendar to Google Calendar</a:t>
           </a:r>
           <a:endParaRPr lang="en-US" sz="1700"/>
         </a:p>
@@ -9437,29 +9488,13 @@
         </a:p>
       </dgm:t>
     </dgm:pt>
-    <dgm:pt modelId="{A16DD009-0464-46BB-993B-71577B13064A}">
-      <dgm:prSet phldrT="[Text]" custT="1"/>
-      <dgm:spPr/>
-      <dgm:t>
-        <a:bodyPr/>
-        <a:lstStyle/>
-        <a:p>
-          <a:r>
-            <a:rPr lang="en-US" sz="1700" smtClean="0"/>
-            <a:t>Manage Roll Call, Study Session</a:t>
-          </a:r>
-        </a:p>
-        <a:p>
-          <a:r>
-            <a:rPr lang="en-US" sz="1700" smtClean="0"/>
-            <a:t>(Change Time &amp; Instructor)</a:t>
-          </a:r>
-          <a:endParaRPr lang="en-US" sz="1700"/>
-        </a:p>
-      </dgm:t>
-    </dgm:pt>
-    <dgm:pt modelId="{0F93F102-D0E3-47CA-8E33-40E3139CFC4F}" type="parTrans" cxnId="{96C9E0C8-96CC-45E8-A39C-1DDE24889B21}">
-      <dgm:prSet/>
+    <dgm:pt modelId="{532EBDFC-4533-4F7D-9687-0178F10968F3}" type="pres">
+      <dgm:prSet presAssocID="{F3CEE3A7-B22A-4DE8-AFDF-EC9CA6476C85}" presName="Name0" presStyleCnt="0">
+        <dgm:presLayoutVars>
+          <dgm:dir/>
+          <dgm:resizeHandles val="exact"/>
+        </dgm:presLayoutVars>
+      </dgm:prSet>
       <dgm:spPr/>
       <dgm:t>
         <a:bodyPr/>
@@ -9469,8 +9504,12 @@
         </a:p>
       </dgm:t>
     </dgm:pt>
-    <dgm:pt modelId="{7AF64493-E53D-477D-B9B1-142AB87CF83B}" type="sibTrans" cxnId="{96C9E0C8-96CC-45E8-A39C-1DDE24889B21}">
-      <dgm:prSet/>
+    <dgm:pt modelId="{AEE18763-321A-443A-BCE8-53AC9B956DD8}" type="pres">
+      <dgm:prSet presAssocID="{DF143685-3892-40D4-AE31-888939203E09}" presName="node" presStyleLbl="node1" presStyleIdx="0" presStyleCnt="6">
+        <dgm:presLayoutVars>
+          <dgm:bulletEnabled val="1"/>
+        </dgm:presLayoutVars>
+      </dgm:prSet>
       <dgm:spPr/>
       <dgm:t>
         <a:bodyPr/>
@@ -9480,23 +9519,8 @@
         </a:p>
       </dgm:t>
     </dgm:pt>
-    <dgm:pt modelId="{63C96C7E-27CE-49F0-953F-0B59171D8597}">
-      <dgm:prSet phldrT="[Text]"/>
-      <dgm:spPr/>
-      <dgm:t>
-        <a:bodyPr/>
-        <a:lstStyle/>
-        <a:p>
-          <a:r>
-            <a:rPr lang="en-US" smtClean="0"/>
-            <a:t>Sync Teaching Calendar to Google Calendar</a:t>
-          </a:r>
-          <a:endParaRPr lang="en-US"/>
-        </a:p>
-      </dgm:t>
-    </dgm:pt>
-    <dgm:pt modelId="{285F3794-D9D8-45A7-95ED-2561A52450D5}" type="parTrans" cxnId="{922F511C-66D1-41B7-9066-2451D52FA4B1}">
-      <dgm:prSet/>
+    <dgm:pt modelId="{ECC16EF8-2A90-41DA-BC7C-475538FDA41A}" type="pres">
+      <dgm:prSet presAssocID="{8B4AC0F4-5B0B-4301-98E6-B937CC840CCB}" presName="sibTrans" presStyleLbl="sibTrans1D1" presStyleIdx="0" presStyleCnt="5"/>
       <dgm:spPr/>
       <dgm:t>
         <a:bodyPr/>
@@ -9506,8 +9530,8 @@
         </a:p>
       </dgm:t>
     </dgm:pt>
-    <dgm:pt modelId="{CA365577-B231-4E1C-A581-451D2396C092}" type="sibTrans" cxnId="{922F511C-66D1-41B7-9066-2451D52FA4B1}">
-      <dgm:prSet/>
+    <dgm:pt modelId="{A73D0C14-9536-411A-9557-F19F00961887}" type="pres">
+      <dgm:prSet presAssocID="{8B4AC0F4-5B0B-4301-98E6-B937CC840CCB}" presName="connectorText" presStyleLbl="sibTrans1D1" presStyleIdx="0" presStyleCnt="5"/>
       <dgm:spPr/>
       <dgm:t>
         <a:bodyPr/>
@@ -9517,65 +9541,82 @@
         </a:p>
       </dgm:t>
     </dgm:pt>
-    <dgm:pt modelId="{532EBDFC-4533-4F7D-9687-0178F10968F3}" type="pres">
-      <dgm:prSet presAssocID="{F3CEE3A7-B22A-4DE8-AFDF-EC9CA6476C85}" presName="Name0" presStyleCnt="0">
-        <dgm:presLayoutVars>
-          <dgm:dir/>
-          <dgm:resizeHandles val="exact"/>
-        </dgm:presLayoutVars>
-      </dgm:prSet>
-      <dgm:spPr/>
-    </dgm:pt>
-    <dgm:pt modelId="{AEE18763-321A-443A-BCE8-53AC9B956DD8}" type="pres">
-      <dgm:prSet presAssocID="{DF143685-3892-40D4-AE31-888939203E09}" presName="node" presStyleLbl="node1" presStyleIdx="0" presStyleCnt="8">
+    <dgm:pt modelId="{A15A32FA-CB14-4475-A82D-E1C91F0916A6}" type="pres">
+      <dgm:prSet presAssocID="{E29D542B-03E9-4D1D-BC65-0079C85BF2FB}" presName="node" presStyleLbl="node1" presStyleIdx="1" presStyleCnt="6">
         <dgm:presLayoutVars>
           <dgm:bulletEnabled val="1"/>
         </dgm:presLayoutVars>
       </dgm:prSet>
       <dgm:spPr/>
+      <dgm:t>
+        <a:bodyPr/>
+        <a:lstStyle/>
+        <a:p>
+          <a:endParaRPr lang="en-US"/>
+        </a:p>
+      </dgm:t>
     </dgm:pt>
-    <dgm:pt modelId="{ECC16EF8-2A90-41DA-BC7C-475538FDA41A}" type="pres">
-      <dgm:prSet presAssocID="{8B4AC0F4-5B0B-4301-98E6-B937CC840CCB}" presName="sibTrans" presStyleLbl="sibTrans1D1" presStyleIdx="0" presStyleCnt="7"/>
+    <dgm:pt modelId="{E9DDE5A0-A196-4E0F-B81D-23F2805C66C8}" type="pres">
+      <dgm:prSet presAssocID="{7E3D8AA3-8272-4321-8996-69A662AB2A0E}" presName="sibTrans" presStyleLbl="sibTrans1D1" presStyleIdx="1" presStyleCnt="5"/>
       <dgm:spPr/>
+      <dgm:t>
+        <a:bodyPr/>
+        <a:lstStyle/>
+        <a:p>
+          <a:endParaRPr lang="en-US"/>
+        </a:p>
+      </dgm:t>
     </dgm:pt>
-    <dgm:pt modelId="{A73D0C14-9536-411A-9557-F19F00961887}" type="pres">
-      <dgm:prSet presAssocID="{8B4AC0F4-5B0B-4301-98E6-B937CC840CCB}" presName="connectorText" presStyleLbl="sibTrans1D1" presStyleIdx="0" presStyleCnt="7"/>
+    <dgm:pt modelId="{FB071BF3-6C40-4DC5-BBC2-6A24D19903DB}" type="pres">
+      <dgm:prSet presAssocID="{7E3D8AA3-8272-4321-8996-69A662AB2A0E}" presName="connectorText" presStyleLbl="sibTrans1D1" presStyleIdx="1" presStyleCnt="5"/>
       <dgm:spPr/>
+      <dgm:t>
+        <a:bodyPr/>
+        <a:lstStyle/>
+        <a:p>
+          <a:endParaRPr lang="en-US"/>
+        </a:p>
+      </dgm:t>
     </dgm:pt>
-    <dgm:pt modelId="{A15A32FA-CB14-4475-A82D-E1C91F0916A6}" type="pres">
-      <dgm:prSet presAssocID="{E29D542B-03E9-4D1D-BC65-0079C85BF2FB}" presName="node" presStyleLbl="node1" presStyleIdx="1" presStyleCnt="8">
+    <dgm:pt modelId="{1C2F4610-73CB-4146-AA09-F130EF591D97}" type="pres">
+      <dgm:prSet presAssocID="{399C9020-CBB4-4B3E-A662-407C29FE4C6F}" presName="node" presStyleLbl="node1" presStyleIdx="2" presStyleCnt="6">
         <dgm:presLayoutVars>
           <dgm:bulletEnabled val="1"/>
         </dgm:presLayoutVars>
       </dgm:prSet>
       <dgm:spPr/>
-    </dgm:pt>
-    <dgm:pt modelId="{E9DDE5A0-A196-4E0F-B81D-23F2805C66C8}" type="pres">
-      <dgm:prSet presAssocID="{7E3D8AA3-8272-4321-8996-69A662AB2A0E}" presName="sibTrans" presStyleLbl="sibTrans1D1" presStyleIdx="1" presStyleCnt="7"/>
-      <dgm:spPr/>
-    </dgm:pt>
-    <dgm:pt modelId="{FB071BF3-6C40-4DC5-BBC2-6A24D19903DB}" type="pres">
-      <dgm:prSet presAssocID="{7E3D8AA3-8272-4321-8996-69A662AB2A0E}" presName="connectorText" presStyleLbl="sibTrans1D1" presStyleIdx="1" presStyleCnt="7"/>
-      <dgm:spPr/>
-    </dgm:pt>
-    <dgm:pt modelId="{1C2F4610-73CB-4146-AA09-F130EF591D97}" type="pres">
-      <dgm:prSet presAssocID="{399C9020-CBB4-4B3E-A662-407C29FE4C6F}" presName="node" presStyleLbl="node1" presStyleIdx="2" presStyleCnt="8">
-        <dgm:presLayoutVars>
-          <dgm:bulletEnabled val="1"/>
-        </dgm:presLayoutVars>
-      </dgm:prSet>
-      <dgm:spPr/>
+      <dgm:t>
+        <a:bodyPr/>
+        <a:lstStyle/>
+        <a:p>
+          <a:endParaRPr lang="en-US"/>
+        </a:p>
+      </dgm:t>
     </dgm:pt>
     <dgm:pt modelId="{B4AC2366-F8AE-4461-99B2-5962ABBC798E}" type="pres">
-      <dgm:prSet presAssocID="{0ED1EF95-7C3B-4583-9F00-97AA5D99BBC2}" presName="sibTrans" presStyleLbl="sibTrans1D1" presStyleIdx="2" presStyleCnt="7"/>
+      <dgm:prSet presAssocID="{0ED1EF95-7C3B-4583-9F00-97AA5D99BBC2}" presName="sibTrans" presStyleLbl="sibTrans1D1" presStyleIdx="2" presStyleCnt="5"/>
       <dgm:spPr/>
+      <dgm:t>
+        <a:bodyPr/>
+        <a:lstStyle/>
+        <a:p>
+          <a:endParaRPr lang="en-US"/>
+        </a:p>
+      </dgm:t>
     </dgm:pt>
     <dgm:pt modelId="{2DC968ED-6CAB-4EE7-87C9-105F8765DB06}" type="pres">
-      <dgm:prSet presAssocID="{0ED1EF95-7C3B-4583-9F00-97AA5D99BBC2}" presName="connectorText" presStyleLbl="sibTrans1D1" presStyleIdx="2" presStyleCnt="7"/>
+      <dgm:prSet presAssocID="{0ED1EF95-7C3B-4583-9F00-97AA5D99BBC2}" presName="connectorText" presStyleLbl="sibTrans1D1" presStyleIdx="2" presStyleCnt="5"/>
       <dgm:spPr/>
+      <dgm:t>
+        <a:bodyPr/>
+        <a:lstStyle/>
+        <a:p>
+          <a:endParaRPr lang="en-US"/>
+        </a:p>
+      </dgm:t>
     </dgm:pt>
     <dgm:pt modelId="{BBEA6F7A-DAB1-4AC1-B829-80681F3B19F5}" type="pres">
-      <dgm:prSet presAssocID="{04B228ED-2CF1-400C-A594-85D2A885ADDE}" presName="node" presStyleLbl="node1" presStyleIdx="3" presStyleCnt="8">
+      <dgm:prSet presAssocID="{04B228ED-2CF1-400C-A594-85D2A885ADDE}" presName="node" presStyleLbl="node1" presStyleIdx="3" presStyleCnt="6">
         <dgm:presLayoutVars>
           <dgm:bulletEnabled val="1"/>
         </dgm:presLayoutVars>
@@ -9590,15 +9631,29 @@
       </dgm:t>
     </dgm:pt>
     <dgm:pt modelId="{D83FC0FD-C30E-47FD-B224-EEFE0690409D}" type="pres">
-      <dgm:prSet presAssocID="{BD91B554-2C6F-4842-AF52-F4F605BB9F70}" presName="sibTrans" presStyleLbl="sibTrans1D1" presStyleIdx="3" presStyleCnt="7"/>
+      <dgm:prSet presAssocID="{BD91B554-2C6F-4842-AF52-F4F605BB9F70}" presName="sibTrans" presStyleLbl="sibTrans1D1" presStyleIdx="3" presStyleCnt="5"/>
       <dgm:spPr/>
+      <dgm:t>
+        <a:bodyPr/>
+        <a:lstStyle/>
+        <a:p>
+          <a:endParaRPr lang="en-US"/>
+        </a:p>
+      </dgm:t>
     </dgm:pt>
     <dgm:pt modelId="{7A401DF6-4B93-403D-9F1B-683F8BB013AB}" type="pres">
-      <dgm:prSet presAssocID="{BD91B554-2C6F-4842-AF52-F4F605BB9F70}" presName="connectorText" presStyleLbl="sibTrans1D1" presStyleIdx="3" presStyleCnt="7"/>
+      <dgm:prSet presAssocID="{BD91B554-2C6F-4842-AF52-F4F605BB9F70}" presName="connectorText" presStyleLbl="sibTrans1D1" presStyleIdx="3" presStyleCnt="5"/>
       <dgm:spPr/>
+      <dgm:t>
+        <a:bodyPr/>
+        <a:lstStyle/>
+        <a:p>
+          <a:endParaRPr lang="en-US"/>
+        </a:p>
+      </dgm:t>
     </dgm:pt>
     <dgm:pt modelId="{E0032F52-7C53-431C-B6E8-7CD6668EBE60}" type="pres">
-      <dgm:prSet presAssocID="{E5637F59-AE26-464D-86FA-A27063F11924}" presName="node" presStyleLbl="node1" presStyleIdx="4" presStyleCnt="8">
+      <dgm:prSet presAssocID="{E5637F59-AE26-464D-86FA-A27063F11924}" presName="node" presStyleLbl="node1" presStyleIdx="4" presStyleCnt="6">
         <dgm:presLayoutVars>
           <dgm:bulletEnabled val="1"/>
         </dgm:presLayoutVars>
@@ -9613,19 +9668,7 @@
       </dgm:t>
     </dgm:pt>
     <dgm:pt modelId="{55AE2ADC-7AC1-4C7A-97F0-578CEB96C95C}" type="pres">
-      <dgm:prSet presAssocID="{C7C6BD95-1EFE-46AF-B55A-5FA28F6E1BDD}" presName="sibTrans" presStyleLbl="sibTrans1D1" presStyleIdx="4" presStyleCnt="7"/>
-      <dgm:spPr/>
-    </dgm:pt>
-    <dgm:pt modelId="{9BD03DD9-1218-4A95-9D29-671ED3DF7260}" type="pres">
-      <dgm:prSet presAssocID="{C7C6BD95-1EFE-46AF-B55A-5FA28F6E1BDD}" presName="connectorText" presStyleLbl="sibTrans1D1" presStyleIdx="4" presStyleCnt="7"/>
-      <dgm:spPr/>
-    </dgm:pt>
-    <dgm:pt modelId="{2FCD22A6-3CE8-4818-83A0-8E649A77CC9E}" type="pres">
-      <dgm:prSet presAssocID="{D5431DEE-502F-4BC9-A785-CB0CAE603410}" presName="node" presStyleLbl="node1" presStyleIdx="5" presStyleCnt="8">
-        <dgm:presLayoutVars>
-          <dgm:bulletEnabled val="1"/>
-        </dgm:presLayoutVars>
-      </dgm:prSet>
+      <dgm:prSet presAssocID="{C7C6BD95-1EFE-46AF-B55A-5FA28F6E1BDD}" presName="sibTrans" presStyleLbl="sibTrans1D1" presStyleIdx="4" presStyleCnt="5"/>
       <dgm:spPr/>
       <dgm:t>
         <a:bodyPr/>
@@ -9635,20 +9678,8 @@
         </a:p>
       </dgm:t>
     </dgm:pt>
-    <dgm:pt modelId="{64DFBA7B-8B4F-4150-8EAB-C574E26C78EB}" type="pres">
-      <dgm:prSet presAssocID="{3AF50F27-C1B8-4C0F-A484-9C0865703B70}" presName="sibTrans" presStyleLbl="sibTrans1D1" presStyleIdx="5" presStyleCnt="7"/>
-      <dgm:spPr/>
-    </dgm:pt>
-    <dgm:pt modelId="{41B01E65-D10D-48F0-884E-614026B59311}" type="pres">
-      <dgm:prSet presAssocID="{3AF50F27-C1B8-4C0F-A484-9C0865703B70}" presName="connectorText" presStyleLbl="sibTrans1D1" presStyleIdx="5" presStyleCnt="7"/>
-      <dgm:spPr/>
-    </dgm:pt>
-    <dgm:pt modelId="{166416FB-B4ED-415F-8781-4FC7E9101CD5}" type="pres">
-      <dgm:prSet presAssocID="{A16DD009-0464-46BB-993B-71577B13064A}" presName="node" presStyleLbl="node1" presStyleIdx="6" presStyleCnt="8">
-        <dgm:presLayoutVars>
-          <dgm:bulletEnabled val="1"/>
-        </dgm:presLayoutVars>
-      </dgm:prSet>
+    <dgm:pt modelId="{9BD03DD9-1218-4A95-9D29-671ED3DF7260}" type="pres">
+      <dgm:prSet presAssocID="{C7C6BD95-1EFE-46AF-B55A-5FA28F6E1BDD}" presName="connectorText" presStyleLbl="sibTrans1D1" presStyleIdx="4" presStyleCnt="5"/>
       <dgm:spPr/>
       <dgm:t>
         <a:bodyPr/>
@@ -9658,16 +9689,8 @@
         </a:p>
       </dgm:t>
     </dgm:pt>
-    <dgm:pt modelId="{838C2C4D-9403-4F20-9AC1-8B210DB5B5E0}" type="pres">
-      <dgm:prSet presAssocID="{7AF64493-E53D-477D-B9B1-142AB87CF83B}" presName="sibTrans" presStyleLbl="sibTrans1D1" presStyleIdx="6" presStyleCnt="7"/>
-      <dgm:spPr/>
-    </dgm:pt>
-    <dgm:pt modelId="{FA1CCFD7-2479-48FB-B9AA-109C279F86FB}" type="pres">
-      <dgm:prSet presAssocID="{7AF64493-E53D-477D-B9B1-142AB87CF83B}" presName="connectorText" presStyleLbl="sibTrans1D1" presStyleIdx="6" presStyleCnt="7"/>
-      <dgm:spPr/>
-    </dgm:pt>
-    <dgm:pt modelId="{FEFC772D-60C1-4286-8CD7-3222525D0477}" type="pres">
-      <dgm:prSet presAssocID="{63C96C7E-27CE-49F0-953F-0B59171D8597}" presName="node" presStyleLbl="node1" presStyleIdx="7" presStyleCnt="8">
+    <dgm:pt modelId="{2FCD22A6-3CE8-4818-83A0-8E649A77CC9E}" type="pres">
+      <dgm:prSet presAssocID="{D5431DEE-502F-4BC9-A785-CB0CAE603410}" presName="node" presStyleLbl="node1" presStyleIdx="5" presStyleCnt="6">
         <dgm:presLayoutVars>
           <dgm:bulletEnabled val="1"/>
         </dgm:presLayoutVars>
@@ -9683,37 +9706,29 @@
     </dgm:pt>
   </dgm:ptLst>
   <dgm:cxnLst>
+    <dgm:cxn modelId="{8A36D92D-2BA0-4A5F-9DCA-1DB93D939863}" srcId="{F3CEE3A7-B22A-4DE8-AFDF-EC9CA6476C85}" destId="{04B228ED-2CF1-400C-A594-85D2A885ADDE}" srcOrd="3" destOrd="0" parTransId="{1357CFAE-0126-4C3A-A7B1-C5AF62CABAE5}" sibTransId="{BD91B554-2C6F-4842-AF52-F4F605BB9F70}"/>
+    <dgm:cxn modelId="{081DA256-4699-47B6-8D19-3FA19EBECA06}" srcId="{F3CEE3A7-B22A-4DE8-AFDF-EC9CA6476C85}" destId="{399C9020-CBB4-4B3E-A662-407C29FE4C6F}" srcOrd="2" destOrd="0" parTransId="{F446708B-332E-497D-8BB4-0068C4319370}" sibTransId="{0ED1EF95-7C3B-4583-9F00-97AA5D99BBC2}"/>
+    <dgm:cxn modelId="{CB88B5D3-7BBB-4D92-AF38-16791C512581}" type="presOf" srcId="{7E3D8AA3-8272-4321-8996-69A662AB2A0E}" destId="{E9DDE5A0-A196-4E0F-B81D-23F2805C66C8}" srcOrd="0" destOrd="0" presId="urn:microsoft.com/office/officeart/2005/8/layout/bProcess3"/>
+    <dgm:cxn modelId="{C6B5C2EB-307A-417B-A46E-27548F7CDC58}" srcId="{F3CEE3A7-B22A-4DE8-AFDF-EC9CA6476C85}" destId="{D5431DEE-502F-4BC9-A785-CB0CAE603410}" srcOrd="5" destOrd="0" parTransId="{F01F8021-B8DA-491B-87A3-AF2FB6EEF78D}" sibTransId="{3AF50F27-C1B8-4C0F-A484-9C0865703B70}"/>
+    <dgm:cxn modelId="{83035A75-DD75-4414-8A56-12978804623F}" type="presOf" srcId="{8B4AC0F4-5B0B-4301-98E6-B937CC840CCB}" destId="{ECC16EF8-2A90-41DA-BC7C-475538FDA41A}" srcOrd="0" destOrd="0" presId="urn:microsoft.com/office/officeart/2005/8/layout/bProcess3"/>
+    <dgm:cxn modelId="{F42B7A5B-1967-4E48-ADDA-2A4EB621CEE8}" type="presOf" srcId="{C7C6BD95-1EFE-46AF-B55A-5FA28F6E1BDD}" destId="{9BD03DD9-1218-4A95-9D29-671ED3DF7260}" srcOrd="1" destOrd="0" presId="urn:microsoft.com/office/officeart/2005/8/layout/bProcess3"/>
     <dgm:cxn modelId="{4B963B49-ED39-48B5-991E-23028E0EBD58}" type="presOf" srcId="{D5431DEE-502F-4BC9-A785-CB0CAE603410}" destId="{2FCD22A6-3CE8-4818-83A0-8E649A77CC9E}" srcOrd="0" destOrd="0" presId="urn:microsoft.com/office/officeart/2005/8/layout/bProcess3"/>
-    <dgm:cxn modelId="{F0D80A7C-37EE-4F2F-A6A0-99B03DE47F5F}" srcId="{F3CEE3A7-B22A-4DE8-AFDF-EC9CA6476C85}" destId="{DF143685-3892-40D4-AE31-888939203E09}" srcOrd="0" destOrd="0" parTransId="{300509BE-180D-4F72-997C-972C34B89B0C}" sibTransId="{8B4AC0F4-5B0B-4301-98E6-B937CC840CCB}"/>
+    <dgm:cxn modelId="{166AE868-3626-48C0-869E-6D494DE3186D}" type="presOf" srcId="{BD91B554-2C6F-4842-AF52-F4F605BB9F70}" destId="{D83FC0FD-C30E-47FD-B224-EEFE0690409D}" srcOrd="0" destOrd="0" presId="urn:microsoft.com/office/officeart/2005/8/layout/bProcess3"/>
+    <dgm:cxn modelId="{61D1F23A-DD76-4809-BD8D-049CECC068D1}" type="presOf" srcId="{DF143685-3892-40D4-AE31-888939203E09}" destId="{AEE18763-321A-443A-BCE8-53AC9B956DD8}" srcOrd="0" destOrd="0" presId="urn:microsoft.com/office/officeart/2005/8/layout/bProcess3"/>
+    <dgm:cxn modelId="{4336A06D-0299-42FD-8FA4-4ABF38452E81}" srcId="{F3CEE3A7-B22A-4DE8-AFDF-EC9CA6476C85}" destId="{E29D542B-03E9-4D1D-BC65-0079C85BF2FB}" srcOrd="1" destOrd="0" parTransId="{C6C5B711-A868-4D69-A115-108F2806A453}" sibTransId="{7E3D8AA3-8272-4321-8996-69A662AB2A0E}"/>
+    <dgm:cxn modelId="{EAF77AD4-9244-409E-8673-D9D19DA392EF}" type="presOf" srcId="{E29D542B-03E9-4D1D-BC65-0079C85BF2FB}" destId="{A15A32FA-CB14-4475-A82D-E1C91F0916A6}" srcOrd="0" destOrd="0" presId="urn:microsoft.com/office/officeart/2005/8/layout/bProcess3"/>
     <dgm:cxn modelId="{8F161D0E-2927-44AD-9CA0-91DDBB4F6BBA}" type="presOf" srcId="{0ED1EF95-7C3B-4583-9F00-97AA5D99BBC2}" destId="{B4AC2366-F8AE-4461-99B2-5962ABBC798E}" srcOrd="0" destOrd="0" presId="urn:microsoft.com/office/officeart/2005/8/layout/bProcess3"/>
-    <dgm:cxn modelId="{248D7EDA-1467-41C7-8E72-FA07F82703CC}" type="presOf" srcId="{399C9020-CBB4-4B3E-A662-407C29FE4C6F}" destId="{1C2F4610-73CB-4146-AA09-F130EF591D97}" srcOrd="0" destOrd="0" presId="urn:microsoft.com/office/officeart/2005/8/layout/bProcess3"/>
-    <dgm:cxn modelId="{EAF77AD4-9244-409E-8673-D9D19DA392EF}" type="presOf" srcId="{E29D542B-03E9-4D1D-BC65-0079C85BF2FB}" destId="{A15A32FA-CB14-4475-A82D-E1C91F0916A6}" srcOrd="0" destOrd="0" presId="urn:microsoft.com/office/officeart/2005/8/layout/bProcess3"/>
-    <dgm:cxn modelId="{96C9E0C8-96CC-45E8-A39C-1DDE24889B21}" srcId="{F3CEE3A7-B22A-4DE8-AFDF-EC9CA6476C85}" destId="{A16DD009-0464-46BB-993B-71577B13064A}" srcOrd="6" destOrd="0" parTransId="{0F93F102-D0E3-47CA-8E33-40E3139CFC4F}" sibTransId="{7AF64493-E53D-477D-B9B1-142AB87CF83B}"/>
-    <dgm:cxn modelId="{922F511C-66D1-41B7-9066-2451D52FA4B1}" srcId="{F3CEE3A7-B22A-4DE8-AFDF-EC9CA6476C85}" destId="{63C96C7E-27CE-49F0-953F-0B59171D8597}" srcOrd="7" destOrd="0" parTransId="{285F3794-D9D8-45A7-95ED-2561A52450D5}" sibTransId="{CA365577-B231-4E1C-A581-451D2396C092}"/>
     <dgm:cxn modelId="{D2515625-8E43-4945-9769-CF121A4C8860}" type="presOf" srcId="{E5637F59-AE26-464D-86FA-A27063F11924}" destId="{E0032F52-7C53-431C-B6E8-7CD6668EBE60}" srcOrd="0" destOrd="0" presId="urn:microsoft.com/office/officeart/2005/8/layout/bProcess3"/>
     <dgm:cxn modelId="{C6974AC0-E5C1-4458-B117-53BDD9A94F06}" type="presOf" srcId="{0ED1EF95-7C3B-4583-9F00-97AA5D99BBC2}" destId="{2DC968ED-6CAB-4EE7-87C9-105F8765DB06}" srcOrd="1" destOrd="0" presId="urn:microsoft.com/office/officeart/2005/8/layout/bProcess3"/>
-    <dgm:cxn modelId="{C6B5C2EB-307A-417B-A46E-27548F7CDC58}" srcId="{F3CEE3A7-B22A-4DE8-AFDF-EC9CA6476C85}" destId="{D5431DEE-502F-4BC9-A785-CB0CAE603410}" srcOrd="5" destOrd="0" parTransId="{F01F8021-B8DA-491B-87A3-AF2FB6EEF78D}" sibTransId="{3AF50F27-C1B8-4C0F-A484-9C0865703B70}"/>
-    <dgm:cxn modelId="{1E28CDE2-A9A8-4C0F-839D-5E35D86847DE}" type="presOf" srcId="{3AF50F27-C1B8-4C0F-A484-9C0865703B70}" destId="{64DFBA7B-8B4F-4150-8EAB-C574E26C78EB}" srcOrd="0" destOrd="0" presId="urn:microsoft.com/office/officeart/2005/8/layout/bProcess3"/>
     <dgm:cxn modelId="{57400421-E32D-44C5-9E59-243D90C42918}" srcId="{F3CEE3A7-B22A-4DE8-AFDF-EC9CA6476C85}" destId="{E5637F59-AE26-464D-86FA-A27063F11924}" srcOrd="4" destOrd="0" parTransId="{1C249998-ACDB-422D-8CEA-800EDE8BD028}" sibTransId="{C7C6BD95-1EFE-46AF-B55A-5FA28F6E1BDD}"/>
+    <dgm:cxn modelId="{1E07F335-ABF8-4AF5-A733-3CE79DFC222F}" type="presOf" srcId="{C7C6BD95-1EFE-46AF-B55A-5FA28F6E1BDD}" destId="{55AE2ADC-7AC1-4C7A-97F0-578CEB96C95C}" srcOrd="0" destOrd="0" presId="urn:microsoft.com/office/officeart/2005/8/layout/bProcess3"/>
+    <dgm:cxn modelId="{248D7EDA-1467-41C7-8E72-FA07F82703CC}" type="presOf" srcId="{399C9020-CBB4-4B3E-A662-407C29FE4C6F}" destId="{1C2F4610-73CB-4146-AA09-F130EF591D97}" srcOrd="0" destOrd="0" presId="urn:microsoft.com/office/officeart/2005/8/layout/bProcess3"/>
+    <dgm:cxn modelId="{4B4091D3-AB26-4692-9F7F-B59DA062851B}" type="presOf" srcId="{BD91B554-2C6F-4842-AF52-F4F605BB9F70}" destId="{7A401DF6-4B93-403D-9F1B-683F8BB013AB}" srcOrd="1" destOrd="0" presId="urn:microsoft.com/office/officeart/2005/8/layout/bProcess3"/>
+    <dgm:cxn modelId="{B40304E5-06D3-44A6-A552-64B40A3383D6}" type="presOf" srcId="{7E3D8AA3-8272-4321-8996-69A662AB2A0E}" destId="{FB071BF3-6C40-4DC5-BBC2-6A24D19903DB}" srcOrd="1" destOrd="0" presId="urn:microsoft.com/office/officeart/2005/8/layout/bProcess3"/>
+    <dgm:cxn modelId="{534366AD-6C4F-4303-8EDD-14AD5B714EFB}" type="presOf" srcId="{04B228ED-2CF1-400C-A594-85D2A885ADDE}" destId="{BBEA6F7A-DAB1-4AC1-B829-80681F3B19F5}" srcOrd="0" destOrd="0" presId="urn:microsoft.com/office/officeart/2005/8/layout/bProcess3"/>
+    <dgm:cxn modelId="{12B50F66-6B34-44CF-B373-7D2A1D0F077A}" type="presOf" srcId="{8B4AC0F4-5B0B-4301-98E6-B937CC840CCB}" destId="{A73D0C14-9536-411A-9557-F19F00961887}" srcOrd="1" destOrd="0" presId="urn:microsoft.com/office/officeart/2005/8/layout/bProcess3"/>
     <dgm:cxn modelId="{76CAFE08-9549-4B0D-91C2-C0EA82117009}" type="presOf" srcId="{F3CEE3A7-B22A-4DE8-AFDF-EC9CA6476C85}" destId="{532EBDFC-4533-4F7D-9687-0178F10968F3}" srcOrd="0" destOrd="0" presId="urn:microsoft.com/office/officeart/2005/8/layout/bProcess3"/>
-    <dgm:cxn modelId="{534366AD-6C4F-4303-8EDD-14AD5B714EFB}" type="presOf" srcId="{04B228ED-2CF1-400C-A594-85D2A885ADDE}" destId="{BBEA6F7A-DAB1-4AC1-B829-80681F3B19F5}" srcOrd="0" destOrd="0" presId="urn:microsoft.com/office/officeart/2005/8/layout/bProcess3"/>
-    <dgm:cxn modelId="{83035A75-DD75-4414-8A56-12978804623F}" type="presOf" srcId="{8B4AC0F4-5B0B-4301-98E6-B937CC840CCB}" destId="{ECC16EF8-2A90-41DA-BC7C-475538FDA41A}" srcOrd="0" destOrd="0" presId="urn:microsoft.com/office/officeart/2005/8/layout/bProcess3"/>
-    <dgm:cxn modelId="{12B50F66-6B34-44CF-B373-7D2A1D0F077A}" type="presOf" srcId="{8B4AC0F4-5B0B-4301-98E6-B937CC840CCB}" destId="{A73D0C14-9536-411A-9557-F19F00961887}" srcOrd="1" destOrd="0" presId="urn:microsoft.com/office/officeart/2005/8/layout/bProcess3"/>
-    <dgm:cxn modelId="{CB88B5D3-7BBB-4D92-AF38-16791C512581}" type="presOf" srcId="{7E3D8AA3-8272-4321-8996-69A662AB2A0E}" destId="{E9DDE5A0-A196-4E0F-B81D-23F2805C66C8}" srcOrd="0" destOrd="0" presId="urn:microsoft.com/office/officeart/2005/8/layout/bProcess3"/>
-    <dgm:cxn modelId="{4B4091D3-AB26-4692-9F7F-B59DA062851B}" type="presOf" srcId="{BD91B554-2C6F-4842-AF52-F4F605BB9F70}" destId="{7A401DF6-4B93-403D-9F1B-683F8BB013AB}" srcOrd="1" destOrd="0" presId="urn:microsoft.com/office/officeart/2005/8/layout/bProcess3"/>
-    <dgm:cxn modelId="{4727AB82-EB96-4B1A-A6D7-ED2739592F4B}" type="presOf" srcId="{63C96C7E-27CE-49F0-953F-0B59171D8597}" destId="{FEFC772D-60C1-4286-8CD7-3222525D0477}" srcOrd="0" destOrd="0" presId="urn:microsoft.com/office/officeart/2005/8/layout/bProcess3"/>
-    <dgm:cxn modelId="{F42B7A5B-1967-4E48-ADDA-2A4EB621CEE8}" type="presOf" srcId="{C7C6BD95-1EFE-46AF-B55A-5FA28F6E1BDD}" destId="{9BD03DD9-1218-4A95-9D29-671ED3DF7260}" srcOrd="1" destOrd="0" presId="urn:microsoft.com/office/officeart/2005/8/layout/bProcess3"/>
-    <dgm:cxn modelId="{8A82F71D-D8AD-4E34-8CBA-C3CAB3AF23EF}" type="presOf" srcId="{7AF64493-E53D-477D-B9B1-142AB87CF83B}" destId="{838C2C4D-9403-4F20-9AC1-8B210DB5B5E0}" srcOrd="0" destOrd="0" presId="urn:microsoft.com/office/officeart/2005/8/layout/bProcess3"/>
-    <dgm:cxn modelId="{081DA256-4699-47B6-8D19-3FA19EBECA06}" srcId="{F3CEE3A7-B22A-4DE8-AFDF-EC9CA6476C85}" destId="{399C9020-CBB4-4B3E-A662-407C29FE4C6F}" srcOrd="2" destOrd="0" parTransId="{F446708B-332E-497D-8BB4-0068C4319370}" sibTransId="{0ED1EF95-7C3B-4583-9F00-97AA5D99BBC2}"/>
-    <dgm:cxn modelId="{4336A06D-0299-42FD-8FA4-4ABF38452E81}" srcId="{F3CEE3A7-B22A-4DE8-AFDF-EC9CA6476C85}" destId="{E29D542B-03E9-4D1D-BC65-0079C85BF2FB}" srcOrd="1" destOrd="0" parTransId="{C6C5B711-A868-4D69-A115-108F2806A453}" sibTransId="{7E3D8AA3-8272-4321-8996-69A662AB2A0E}"/>
-    <dgm:cxn modelId="{8A36D92D-2BA0-4A5F-9DCA-1DB93D939863}" srcId="{F3CEE3A7-B22A-4DE8-AFDF-EC9CA6476C85}" destId="{04B228ED-2CF1-400C-A594-85D2A885ADDE}" srcOrd="3" destOrd="0" parTransId="{1357CFAE-0126-4C3A-A7B1-C5AF62CABAE5}" sibTransId="{BD91B554-2C6F-4842-AF52-F4F605BB9F70}"/>
-    <dgm:cxn modelId="{E94E2465-417B-4BD6-AC20-E2B22244AEAF}" type="presOf" srcId="{3AF50F27-C1B8-4C0F-A484-9C0865703B70}" destId="{41B01E65-D10D-48F0-884E-614026B59311}" srcOrd="1" destOrd="0" presId="urn:microsoft.com/office/officeart/2005/8/layout/bProcess3"/>
-    <dgm:cxn modelId="{61D1F23A-DD76-4809-BD8D-049CECC068D1}" type="presOf" srcId="{DF143685-3892-40D4-AE31-888939203E09}" destId="{AEE18763-321A-443A-BCE8-53AC9B956DD8}" srcOrd="0" destOrd="0" presId="urn:microsoft.com/office/officeart/2005/8/layout/bProcess3"/>
-    <dgm:cxn modelId="{6AB41C46-7A15-4FB7-8087-2700BFC77C80}" type="presOf" srcId="{A16DD009-0464-46BB-993B-71577B13064A}" destId="{166416FB-B4ED-415F-8781-4FC7E9101CD5}" srcOrd="0" destOrd="0" presId="urn:microsoft.com/office/officeart/2005/8/layout/bProcess3"/>
-    <dgm:cxn modelId="{166AE868-3626-48C0-869E-6D494DE3186D}" type="presOf" srcId="{BD91B554-2C6F-4842-AF52-F4F605BB9F70}" destId="{D83FC0FD-C30E-47FD-B224-EEFE0690409D}" srcOrd="0" destOrd="0" presId="urn:microsoft.com/office/officeart/2005/8/layout/bProcess3"/>
-    <dgm:cxn modelId="{0E3BC137-7669-471B-B518-23C88EA3B5F1}" type="presOf" srcId="{7AF64493-E53D-477D-B9B1-142AB87CF83B}" destId="{FA1CCFD7-2479-48FB-B9AA-109C279F86FB}" srcOrd="1" destOrd="0" presId="urn:microsoft.com/office/officeart/2005/8/layout/bProcess3"/>
-    <dgm:cxn modelId="{B40304E5-06D3-44A6-A552-64B40A3383D6}" type="presOf" srcId="{7E3D8AA3-8272-4321-8996-69A662AB2A0E}" destId="{FB071BF3-6C40-4DC5-BBC2-6A24D19903DB}" srcOrd="1" destOrd="0" presId="urn:microsoft.com/office/officeart/2005/8/layout/bProcess3"/>
-    <dgm:cxn modelId="{1E07F335-ABF8-4AF5-A733-3CE79DFC222F}" type="presOf" srcId="{C7C6BD95-1EFE-46AF-B55A-5FA28F6E1BDD}" destId="{55AE2ADC-7AC1-4C7A-97F0-578CEB96C95C}" srcOrd="0" destOrd="0" presId="urn:microsoft.com/office/officeart/2005/8/layout/bProcess3"/>
+    <dgm:cxn modelId="{F0D80A7C-37EE-4F2F-A6A0-99B03DE47F5F}" srcId="{F3CEE3A7-B22A-4DE8-AFDF-EC9CA6476C85}" destId="{DF143685-3892-40D4-AE31-888939203E09}" srcOrd="0" destOrd="0" parTransId="{300509BE-180D-4F72-997C-972C34B89B0C}" sibTransId="{8B4AC0F4-5B0B-4301-98E6-B937CC840CCB}"/>
     <dgm:cxn modelId="{CC4D523E-DFDD-4C2A-89D8-2D640701DA3A}" type="presParOf" srcId="{532EBDFC-4533-4F7D-9687-0178F10968F3}" destId="{AEE18763-321A-443A-BCE8-53AC9B956DD8}" srcOrd="0" destOrd="0" presId="urn:microsoft.com/office/officeart/2005/8/layout/bProcess3"/>
     <dgm:cxn modelId="{0F0294C3-48C3-4085-A450-5EBBC4A1A018}" type="presParOf" srcId="{532EBDFC-4533-4F7D-9687-0178F10968F3}" destId="{ECC16EF8-2A90-41DA-BC7C-475538FDA41A}" srcOrd="1" destOrd="0" presId="urn:microsoft.com/office/officeart/2005/8/layout/bProcess3"/>
     <dgm:cxn modelId="{172FADD8-1762-4846-BA3F-9CD39958377D}" type="presParOf" srcId="{ECC16EF8-2A90-41DA-BC7C-475538FDA41A}" destId="{A73D0C14-9536-411A-9557-F19F00961887}" srcOrd="0" destOrd="0" presId="urn:microsoft.com/office/officeart/2005/8/layout/bProcess3"/>
@@ -9730,12 +9745,6 @@
     <dgm:cxn modelId="{F9EF7728-5E1C-4B67-A441-7C8C67AA914E}" type="presParOf" srcId="{532EBDFC-4533-4F7D-9687-0178F10968F3}" destId="{55AE2ADC-7AC1-4C7A-97F0-578CEB96C95C}" srcOrd="9" destOrd="0" presId="urn:microsoft.com/office/officeart/2005/8/layout/bProcess3"/>
     <dgm:cxn modelId="{630AC442-0AE2-4814-AE0C-DF1F62B3B003}" type="presParOf" srcId="{55AE2ADC-7AC1-4C7A-97F0-578CEB96C95C}" destId="{9BD03DD9-1218-4A95-9D29-671ED3DF7260}" srcOrd="0" destOrd="0" presId="urn:microsoft.com/office/officeart/2005/8/layout/bProcess3"/>
     <dgm:cxn modelId="{444E4310-16D5-4EF0-B6C1-50295D93F730}" type="presParOf" srcId="{532EBDFC-4533-4F7D-9687-0178F10968F3}" destId="{2FCD22A6-3CE8-4818-83A0-8E649A77CC9E}" srcOrd="10" destOrd="0" presId="urn:microsoft.com/office/officeart/2005/8/layout/bProcess3"/>
-    <dgm:cxn modelId="{D289BF8E-8248-4BC8-A8A0-B8400DA38EBD}" type="presParOf" srcId="{532EBDFC-4533-4F7D-9687-0178F10968F3}" destId="{64DFBA7B-8B4F-4150-8EAB-C574E26C78EB}" srcOrd="11" destOrd="0" presId="urn:microsoft.com/office/officeart/2005/8/layout/bProcess3"/>
-    <dgm:cxn modelId="{5AE9FC09-09A0-4A6C-9E94-E1EDB9AC0186}" type="presParOf" srcId="{64DFBA7B-8B4F-4150-8EAB-C574E26C78EB}" destId="{41B01E65-D10D-48F0-884E-614026B59311}" srcOrd="0" destOrd="0" presId="urn:microsoft.com/office/officeart/2005/8/layout/bProcess3"/>
-    <dgm:cxn modelId="{9B048377-B636-48A5-BC9E-58611AD9E24A}" type="presParOf" srcId="{532EBDFC-4533-4F7D-9687-0178F10968F3}" destId="{166416FB-B4ED-415F-8781-4FC7E9101CD5}" srcOrd="12" destOrd="0" presId="urn:microsoft.com/office/officeart/2005/8/layout/bProcess3"/>
-    <dgm:cxn modelId="{083D4D4D-20D1-4A9F-92F1-48F4091430F5}" type="presParOf" srcId="{532EBDFC-4533-4F7D-9687-0178F10968F3}" destId="{838C2C4D-9403-4F20-9AC1-8B210DB5B5E0}" srcOrd="13" destOrd="0" presId="urn:microsoft.com/office/officeart/2005/8/layout/bProcess3"/>
-    <dgm:cxn modelId="{3F17A756-265A-4811-988D-49061C3CDEAC}" type="presParOf" srcId="{838C2C4D-9403-4F20-9AC1-8B210DB5B5E0}" destId="{FA1CCFD7-2479-48FB-B9AA-109C279F86FB}" srcOrd="0" destOrd="0" presId="urn:microsoft.com/office/officeart/2005/8/layout/bProcess3"/>
-    <dgm:cxn modelId="{A1AF19E5-7049-4FBD-B9AD-C8E4678FF885}" type="presParOf" srcId="{532EBDFC-4533-4F7D-9687-0178F10968F3}" destId="{FEFC772D-60C1-4286-8CD7-3222525D0477}" srcOrd="14" destOrd="0" presId="urn:microsoft.com/office/officeart/2005/8/layout/bProcess3"/>
   </dgm:cxnLst>
   <dgm:bg/>
   <dgm:whole/>
@@ -9763,7 +9772,7 @@
       <dsp:spPr>
         <a:xfrm>
           <a:off x="0" y="371858"/>
-          <a:ext cx="8229599" cy="478800"/>
+          <a:ext cx="8229600" cy="478800"/>
         </a:xfrm>
         <a:prstGeom prst="rect">
           <a:avLst/>
@@ -9900,7 +9909,7 @@
       <dsp:spPr>
         <a:xfrm>
           <a:off x="0" y="1233698"/>
-          <a:ext cx="8229599" cy="478800"/>
+          <a:ext cx="8229600" cy="478800"/>
         </a:xfrm>
         <a:prstGeom prst="rect">
           <a:avLst/>
@@ -10037,7 +10046,7 @@
       <dsp:spPr>
         <a:xfrm>
           <a:off x="0" y="2095538"/>
-          <a:ext cx="8229599" cy="478800"/>
+          <a:ext cx="8229600" cy="478800"/>
         </a:xfrm>
         <a:prstGeom prst="rect">
           <a:avLst/>
@@ -10174,7 +10183,7 @@
       <dsp:spPr>
         <a:xfrm>
           <a:off x="0" y="2957378"/>
-          <a:ext cx="8229599" cy="478800"/>
+          <a:ext cx="8229600" cy="478800"/>
         </a:xfrm>
         <a:prstGeom prst="rect">
           <a:avLst/>
@@ -10311,7 +10320,7 @@
       <dsp:spPr>
         <a:xfrm>
           <a:off x="0" y="3819218"/>
-          <a:ext cx="8229599" cy="478800"/>
+          <a:ext cx="8229600" cy="478800"/>
         </a:xfrm>
         <a:prstGeom prst="rect">
           <a:avLst/>
@@ -13977,8 +13986,8 @@
       </dsp:nvSpPr>
       <dsp:spPr>
         <a:xfrm>
-          <a:off x="2697550" y="539651"/>
-          <a:ext cx="415363" cy="91440"/>
+          <a:off x="2379359" y="1163435"/>
+          <a:ext cx="515615" cy="91440"/>
         </a:xfrm>
         <a:custGeom>
           <a:avLst/>
@@ -13992,7 +14001,7 @@
                 <a:pt x="0" y="45720"/>
               </a:moveTo>
               <a:lnTo>
-                <a:pt x="415363" y="45720"/>
+                <a:pt x="515615" y="45720"/>
               </a:lnTo>
             </a:path>
           </a:pathLst>
@@ -14045,8 +14054,8 @@
         </a:p>
       </dsp:txBody>
       <dsp:txXfrm>
-        <a:off x="2894083" y="583139"/>
-        <a:ext cx="22298" cy="4463"/>
+        <a:off x="2623511" y="1206424"/>
+        <a:ext cx="27310" cy="5462"/>
       </dsp:txXfrm>
     </dsp:sp>
     <dsp:sp modelId="{AEE18763-321A-443A-BCE8-53AC9B956DD8}">
@@ -14056,8 +14065,8 @@
       </dsp:nvSpPr>
       <dsp:spPr>
         <a:xfrm>
-          <a:off x="760378" y="3679"/>
-          <a:ext cx="1938972" cy="1163383"/>
+          <a:off x="6308" y="496700"/>
+          <a:ext cx="2374850" cy="1424910"/>
         </a:xfrm>
         <a:prstGeom prst="rect">
           <a:avLst/>
@@ -14134,8 +14143,8 @@
         </a:p>
       </dsp:txBody>
       <dsp:txXfrm>
-        <a:off x="760378" y="3679"/>
-        <a:ext cx="1938972" cy="1163383"/>
+        <a:off x="6308" y="496700"/>
+        <a:ext cx="2374850" cy="1424910"/>
       </dsp:txXfrm>
     </dsp:sp>
     <dsp:sp modelId="{E9DDE5A0-A196-4E0F-B81D-23F2805C66C8}">
@@ -14145,8 +14154,8 @@
       </dsp:nvSpPr>
       <dsp:spPr>
         <a:xfrm>
-          <a:off x="5082486" y="539651"/>
-          <a:ext cx="415363" cy="91440"/>
+          <a:off x="5300425" y="1163435"/>
+          <a:ext cx="515615" cy="91440"/>
         </a:xfrm>
         <a:custGeom>
           <a:avLst/>
@@ -14160,7 +14169,7 @@
                 <a:pt x="0" y="45720"/>
               </a:moveTo>
               <a:lnTo>
-                <a:pt x="415363" y="45720"/>
+                <a:pt x="515615" y="45720"/>
               </a:lnTo>
             </a:path>
           </a:pathLst>
@@ -14213,8 +14222,8 @@
         </a:p>
       </dsp:txBody>
       <dsp:txXfrm>
-        <a:off x="5279018" y="583139"/>
-        <a:ext cx="22298" cy="4463"/>
+        <a:off x="5544577" y="1206424"/>
+        <a:ext cx="27310" cy="5462"/>
       </dsp:txXfrm>
     </dsp:sp>
     <dsp:sp modelId="{A15A32FA-CB14-4475-A82D-E1C91F0916A6}">
@@ -14224,8 +14233,624 @@
       </dsp:nvSpPr>
       <dsp:spPr>
         <a:xfrm>
-          <a:off x="3145313" y="3679"/>
-          <a:ext cx="1938972" cy="1163383"/>
+          <a:off x="2927374" y="496700"/>
+          <a:ext cx="2374850" cy="1424910"/>
+        </a:xfrm>
+        <a:prstGeom prst="rect">
+          <a:avLst/>
+        </a:prstGeom>
+        <a:solidFill>
+          <a:schemeClr val="dk2">
+            <a:hueOff val="0"/>
+            <a:satOff val="0"/>
+            <a:lumOff val="0"/>
+            <a:alphaOff val="0"/>
+          </a:schemeClr>
+        </a:solidFill>
+        <a:ln w="38100" cap="flat" cmpd="sng" algn="ctr">
+          <a:solidFill>
+            <a:schemeClr val="lt2">
+              <a:hueOff val="0"/>
+              <a:satOff val="0"/>
+              <a:lumOff val="0"/>
+              <a:alphaOff val="0"/>
+            </a:schemeClr>
+          </a:solidFill>
+          <a:prstDash val="solid"/>
+        </a:ln>
+        <a:effectLst>
+          <a:outerShdw blurRad="57150" dist="38100" dir="5400000" algn="ctr" rotWithShape="0">
+            <a:schemeClr val="dk2">
+              <a:hueOff val="0"/>
+              <a:satOff val="0"/>
+              <a:lumOff val="0"/>
+              <a:alphaOff val="0"/>
+              <a:shade val="9000"/>
+              <a:alpha val="48000"/>
+              <a:satMod val="105000"/>
+            </a:schemeClr>
+          </a:outerShdw>
+        </a:effectLst>
+      </dsp:spPr>
+      <dsp:style>
+        <a:lnRef idx="3">
+          <a:scrgbClr r="0" g="0" b="0"/>
+        </a:lnRef>
+        <a:fillRef idx="1">
+          <a:scrgbClr r="0" g="0" b="0"/>
+        </a:fillRef>
+        <a:effectRef idx="1">
+          <a:scrgbClr r="0" g="0" b="0"/>
+        </a:effectRef>
+        <a:fontRef idx="minor">
+          <a:schemeClr val="lt1"/>
+        </a:fontRef>
+      </dsp:style>
+      <dsp:txBody>
+        <a:bodyPr spcFirstLastPara="0" vert="horz" wrap="square" lIns="120904" tIns="120904" rIns="120904" bIns="120904" numCol="1" spcCol="1270" anchor="ctr" anchorCtr="0">
+          <a:noAutofit/>
+        </a:bodyPr>
+        <a:lstStyle/>
+        <a:p>
+          <a:pPr lvl="0" algn="ctr" defTabSz="755650">
+            <a:lnSpc>
+              <a:spcPct val="90000"/>
+            </a:lnSpc>
+            <a:spcBef>
+              <a:spcPct val="0"/>
+            </a:spcBef>
+            <a:spcAft>
+              <a:spcPct val="35000"/>
+            </a:spcAft>
+          </a:pPr>
+          <a:r>
+            <a:rPr lang="en-US" sz="1700" b="1" kern="1200" smtClean="0"/>
+            <a:t>Check Attendance by Taking Picture</a:t>
+          </a:r>
+          <a:endParaRPr lang="en-US" sz="1700" b="1" kern="1200"/>
+        </a:p>
+      </dsp:txBody>
+      <dsp:txXfrm>
+        <a:off x="2927374" y="496700"/>
+        <a:ext cx="2374850" cy="1424910"/>
+      </dsp:txXfrm>
+    </dsp:sp>
+    <dsp:sp modelId="{B4AC2366-F8AE-4461-99B2-5962ABBC798E}">
+      <dsp:nvSpPr>
+        <dsp:cNvPr id="0" name=""/>
+        <dsp:cNvSpPr/>
+      </dsp:nvSpPr>
+      <dsp:spPr>
+        <a:xfrm>
+          <a:off x="1193734" y="1919810"/>
+          <a:ext cx="5842131" cy="515615"/>
+        </a:xfrm>
+        <a:custGeom>
+          <a:avLst/>
+          <a:gdLst/>
+          <a:ahLst/>
+          <a:cxnLst/>
+          <a:rect l="0" t="0" r="0" b="0"/>
+          <a:pathLst>
+            <a:path>
+              <a:moveTo>
+                <a:pt x="5842131" y="0"/>
+              </a:moveTo>
+              <a:lnTo>
+                <a:pt x="5842131" y="274907"/>
+              </a:lnTo>
+              <a:lnTo>
+                <a:pt x="0" y="274907"/>
+              </a:lnTo>
+              <a:lnTo>
+                <a:pt x="0" y="515615"/>
+              </a:lnTo>
+            </a:path>
+          </a:pathLst>
+        </a:custGeom>
+        <a:noFill/>
+        <a:ln w="9525" cap="flat" cmpd="sng" algn="ctr">
+          <a:solidFill>
+            <a:schemeClr val="dk2">
+              <a:hueOff val="0"/>
+              <a:satOff val="0"/>
+              <a:lumOff val="0"/>
+              <a:alphaOff val="0"/>
+            </a:schemeClr>
+          </a:solidFill>
+          <a:prstDash val="solid"/>
+          <a:tailEnd type="arrow"/>
+        </a:ln>
+        <a:effectLst/>
+      </dsp:spPr>
+      <dsp:style>
+        <a:lnRef idx="1">
+          <a:scrgbClr r="0" g="0" b="0"/>
+        </a:lnRef>
+        <a:fillRef idx="0">
+          <a:scrgbClr r="0" g="0" b="0"/>
+        </a:fillRef>
+        <a:effectRef idx="0">
+          <a:scrgbClr r="0" g="0" b="0"/>
+        </a:effectRef>
+        <a:fontRef idx="minor"/>
+      </dsp:style>
+      <dsp:txBody>
+        <a:bodyPr spcFirstLastPara="0" vert="horz" wrap="square" lIns="12700" tIns="0" rIns="12700" bIns="0" numCol="1" spcCol="1270" anchor="ctr" anchorCtr="0">
+          <a:noAutofit/>
+        </a:bodyPr>
+        <a:lstStyle/>
+        <a:p>
+          <a:pPr lvl="0" algn="ctr" defTabSz="222250">
+            <a:lnSpc>
+              <a:spcPct val="90000"/>
+            </a:lnSpc>
+            <a:spcBef>
+              <a:spcPct val="0"/>
+            </a:spcBef>
+            <a:spcAft>
+              <a:spcPct val="35000"/>
+            </a:spcAft>
+          </a:pPr>
+          <a:endParaRPr lang="en-US" sz="500" kern="1200"/>
+        </a:p>
+      </dsp:txBody>
+      <dsp:txXfrm>
+        <a:off x="3968109" y="2174887"/>
+        <a:ext cx="293380" cy="5462"/>
+      </dsp:txXfrm>
+    </dsp:sp>
+    <dsp:sp modelId="{1C2F4610-73CB-4146-AA09-F130EF591D97}">
+      <dsp:nvSpPr>
+        <dsp:cNvPr id="0" name=""/>
+        <dsp:cNvSpPr/>
+      </dsp:nvSpPr>
+      <dsp:spPr>
+        <a:xfrm>
+          <a:off x="5848440" y="496700"/>
+          <a:ext cx="2374850" cy="1424910"/>
+        </a:xfrm>
+        <a:prstGeom prst="rect">
+          <a:avLst/>
+        </a:prstGeom>
+        <a:solidFill>
+          <a:schemeClr val="dk2">
+            <a:hueOff val="0"/>
+            <a:satOff val="0"/>
+            <a:lumOff val="0"/>
+            <a:alphaOff val="0"/>
+          </a:schemeClr>
+        </a:solidFill>
+        <a:ln w="38100" cap="flat" cmpd="sng" algn="ctr">
+          <a:solidFill>
+            <a:schemeClr val="lt2">
+              <a:hueOff val="0"/>
+              <a:satOff val="0"/>
+              <a:lumOff val="0"/>
+              <a:alphaOff val="0"/>
+            </a:schemeClr>
+          </a:solidFill>
+          <a:prstDash val="solid"/>
+        </a:ln>
+        <a:effectLst>
+          <a:outerShdw blurRad="57150" dist="38100" dir="5400000" algn="ctr" rotWithShape="0">
+            <a:schemeClr val="dk2">
+              <a:hueOff val="0"/>
+              <a:satOff val="0"/>
+              <a:lumOff val="0"/>
+              <a:alphaOff val="0"/>
+              <a:shade val="9000"/>
+              <a:alpha val="48000"/>
+              <a:satMod val="105000"/>
+            </a:schemeClr>
+          </a:outerShdw>
+        </a:effectLst>
+      </dsp:spPr>
+      <dsp:style>
+        <a:lnRef idx="3">
+          <a:scrgbClr r="0" g="0" b="0"/>
+        </a:lnRef>
+        <a:fillRef idx="1">
+          <a:scrgbClr r="0" g="0" b="0"/>
+        </a:fillRef>
+        <a:effectRef idx="1">
+          <a:scrgbClr r="0" g="0" b="0"/>
+        </a:effectRef>
+        <a:fontRef idx="minor">
+          <a:schemeClr val="lt1"/>
+        </a:fontRef>
+      </dsp:style>
+      <dsp:txBody>
+        <a:bodyPr spcFirstLastPara="0" vert="horz" wrap="square" lIns="120904" tIns="120904" rIns="120904" bIns="120904" numCol="1" spcCol="1270" anchor="ctr" anchorCtr="0">
+          <a:noAutofit/>
+        </a:bodyPr>
+        <a:lstStyle/>
+        <a:p>
+          <a:pPr lvl="0" algn="ctr" defTabSz="755650">
+            <a:lnSpc>
+              <a:spcPct val="90000"/>
+            </a:lnSpc>
+            <a:spcBef>
+              <a:spcPct val="0"/>
+            </a:spcBef>
+            <a:spcAft>
+              <a:spcPct val="35000"/>
+            </a:spcAft>
+          </a:pPr>
+          <a:r>
+            <a:rPr lang="en-US" sz="1700" b="1" kern="1200" smtClean="0"/>
+            <a:t>Check Attendance Manually</a:t>
+          </a:r>
+        </a:p>
+        <a:p>
+          <a:pPr lvl="0" algn="ctr" defTabSz="755650">
+            <a:lnSpc>
+              <a:spcPct val="90000"/>
+            </a:lnSpc>
+            <a:spcBef>
+              <a:spcPct val="0"/>
+            </a:spcBef>
+            <a:spcAft>
+              <a:spcPct val="35000"/>
+            </a:spcAft>
+          </a:pPr>
+          <a:r>
+            <a:rPr lang="en-US" sz="1700" b="1" kern="1200" smtClean="0"/>
+            <a:t>(Web &amp; Mobile)</a:t>
+          </a:r>
+          <a:endParaRPr lang="en-US" sz="1700" b="1" kern="1200"/>
+        </a:p>
+      </dsp:txBody>
+      <dsp:txXfrm>
+        <a:off x="5848440" y="496700"/>
+        <a:ext cx="2374850" cy="1424910"/>
+      </dsp:txXfrm>
+    </dsp:sp>
+    <dsp:sp modelId="{D83FC0FD-C30E-47FD-B224-EEFE0690409D}">
+      <dsp:nvSpPr>
+        <dsp:cNvPr id="0" name=""/>
+        <dsp:cNvSpPr/>
+      </dsp:nvSpPr>
+      <dsp:spPr>
+        <a:xfrm>
+          <a:off x="2379359" y="3134561"/>
+          <a:ext cx="515615" cy="91440"/>
+        </a:xfrm>
+        <a:custGeom>
+          <a:avLst/>
+          <a:gdLst/>
+          <a:ahLst/>
+          <a:cxnLst/>
+          <a:rect l="0" t="0" r="0" b="0"/>
+          <a:pathLst>
+            <a:path>
+              <a:moveTo>
+                <a:pt x="0" y="45720"/>
+              </a:moveTo>
+              <a:lnTo>
+                <a:pt x="515615" y="45720"/>
+              </a:lnTo>
+            </a:path>
+          </a:pathLst>
+        </a:custGeom>
+        <a:noFill/>
+        <a:ln w="9525" cap="flat" cmpd="sng" algn="ctr">
+          <a:solidFill>
+            <a:schemeClr val="dk2">
+              <a:hueOff val="0"/>
+              <a:satOff val="0"/>
+              <a:lumOff val="0"/>
+              <a:alphaOff val="0"/>
+            </a:schemeClr>
+          </a:solidFill>
+          <a:prstDash val="solid"/>
+          <a:tailEnd type="arrow"/>
+        </a:ln>
+        <a:effectLst/>
+      </dsp:spPr>
+      <dsp:style>
+        <a:lnRef idx="1">
+          <a:scrgbClr r="0" g="0" b="0"/>
+        </a:lnRef>
+        <a:fillRef idx="0">
+          <a:scrgbClr r="0" g="0" b="0"/>
+        </a:fillRef>
+        <a:effectRef idx="0">
+          <a:scrgbClr r="0" g="0" b="0"/>
+        </a:effectRef>
+        <a:fontRef idx="minor"/>
+      </dsp:style>
+      <dsp:txBody>
+        <a:bodyPr spcFirstLastPara="0" vert="horz" wrap="square" lIns="12700" tIns="0" rIns="12700" bIns="0" numCol="1" spcCol="1270" anchor="ctr" anchorCtr="0">
+          <a:noAutofit/>
+        </a:bodyPr>
+        <a:lstStyle/>
+        <a:p>
+          <a:pPr lvl="0" algn="ctr" defTabSz="222250">
+            <a:lnSpc>
+              <a:spcPct val="90000"/>
+            </a:lnSpc>
+            <a:spcBef>
+              <a:spcPct val="0"/>
+            </a:spcBef>
+            <a:spcAft>
+              <a:spcPct val="35000"/>
+            </a:spcAft>
+          </a:pPr>
+          <a:endParaRPr lang="en-US" sz="500" kern="1200"/>
+        </a:p>
+      </dsp:txBody>
+      <dsp:txXfrm>
+        <a:off x="2623511" y="3177550"/>
+        <a:ext cx="27310" cy="5462"/>
+      </dsp:txXfrm>
+    </dsp:sp>
+    <dsp:sp modelId="{BBEA6F7A-DAB1-4AC1-B829-80681F3B19F5}">
+      <dsp:nvSpPr>
+        <dsp:cNvPr id="0" name=""/>
+        <dsp:cNvSpPr/>
+      </dsp:nvSpPr>
+      <dsp:spPr>
+        <a:xfrm>
+          <a:off x="6308" y="2467826"/>
+          <a:ext cx="2374850" cy="1424910"/>
+        </a:xfrm>
+        <a:prstGeom prst="rect">
+          <a:avLst/>
+        </a:prstGeom>
+        <a:solidFill>
+          <a:schemeClr val="dk2">
+            <a:hueOff val="0"/>
+            <a:satOff val="0"/>
+            <a:lumOff val="0"/>
+            <a:alphaOff val="0"/>
+          </a:schemeClr>
+        </a:solidFill>
+        <a:ln w="38100" cap="flat" cmpd="sng" algn="ctr">
+          <a:solidFill>
+            <a:schemeClr val="lt2">
+              <a:hueOff val="0"/>
+              <a:satOff val="0"/>
+              <a:lumOff val="0"/>
+              <a:alphaOff val="0"/>
+            </a:schemeClr>
+          </a:solidFill>
+          <a:prstDash val="solid"/>
+        </a:ln>
+        <a:effectLst>
+          <a:outerShdw blurRad="57150" dist="38100" dir="5400000" algn="ctr" rotWithShape="0">
+            <a:schemeClr val="dk2">
+              <a:hueOff val="0"/>
+              <a:satOff val="0"/>
+              <a:lumOff val="0"/>
+              <a:alphaOff val="0"/>
+              <a:shade val="9000"/>
+              <a:alpha val="48000"/>
+              <a:satMod val="105000"/>
+            </a:schemeClr>
+          </a:outerShdw>
+        </a:effectLst>
+      </dsp:spPr>
+      <dsp:style>
+        <a:lnRef idx="3">
+          <a:scrgbClr r="0" g="0" b="0"/>
+        </a:lnRef>
+        <a:fillRef idx="1">
+          <a:scrgbClr r="0" g="0" b="0"/>
+        </a:fillRef>
+        <a:effectRef idx="1">
+          <a:scrgbClr r="0" g="0" b="0"/>
+        </a:effectRef>
+        <a:fontRef idx="minor">
+          <a:schemeClr val="lt1"/>
+        </a:fontRef>
+      </dsp:style>
+      <dsp:txBody>
+        <a:bodyPr spcFirstLastPara="0" vert="horz" wrap="square" lIns="120904" tIns="120904" rIns="120904" bIns="120904" numCol="1" spcCol="1270" anchor="ctr" anchorCtr="0">
+          <a:noAutofit/>
+        </a:bodyPr>
+        <a:lstStyle/>
+        <a:p>
+          <a:pPr lvl="0" algn="ctr" defTabSz="755650">
+            <a:lnSpc>
+              <a:spcPct val="90000"/>
+            </a:lnSpc>
+            <a:spcBef>
+              <a:spcPct val="0"/>
+            </a:spcBef>
+            <a:spcAft>
+              <a:spcPct val="35000"/>
+            </a:spcAft>
+          </a:pPr>
+          <a:r>
+            <a:rPr lang="en-US" sz="1700" b="1" kern="1200" smtClean="0"/>
+            <a:t>Check Attendance Offline &amp; Sync Data Online</a:t>
+          </a:r>
+          <a:endParaRPr lang="en-US" sz="1700" b="1" kern="1200"/>
+        </a:p>
+      </dsp:txBody>
+      <dsp:txXfrm>
+        <a:off x="6308" y="2467826"/>
+        <a:ext cx="2374850" cy="1424910"/>
+      </dsp:txXfrm>
+    </dsp:sp>
+    <dsp:sp modelId="{55AE2ADC-7AC1-4C7A-97F0-578CEB96C95C}">
+      <dsp:nvSpPr>
+        <dsp:cNvPr id="0" name=""/>
+        <dsp:cNvSpPr/>
+      </dsp:nvSpPr>
+      <dsp:spPr>
+        <a:xfrm>
+          <a:off x="5300425" y="3134561"/>
+          <a:ext cx="515615" cy="91440"/>
+        </a:xfrm>
+        <a:custGeom>
+          <a:avLst/>
+          <a:gdLst/>
+          <a:ahLst/>
+          <a:cxnLst/>
+          <a:rect l="0" t="0" r="0" b="0"/>
+          <a:pathLst>
+            <a:path>
+              <a:moveTo>
+                <a:pt x="0" y="45720"/>
+              </a:moveTo>
+              <a:lnTo>
+                <a:pt x="515615" y="45720"/>
+              </a:lnTo>
+            </a:path>
+          </a:pathLst>
+        </a:custGeom>
+        <a:noFill/>
+        <a:ln w="9525" cap="flat" cmpd="sng" algn="ctr">
+          <a:solidFill>
+            <a:schemeClr val="dk2">
+              <a:hueOff val="0"/>
+              <a:satOff val="0"/>
+              <a:lumOff val="0"/>
+              <a:alphaOff val="0"/>
+            </a:schemeClr>
+          </a:solidFill>
+          <a:prstDash val="solid"/>
+          <a:tailEnd type="arrow"/>
+        </a:ln>
+        <a:effectLst/>
+      </dsp:spPr>
+      <dsp:style>
+        <a:lnRef idx="1">
+          <a:scrgbClr r="0" g="0" b="0"/>
+        </a:lnRef>
+        <a:fillRef idx="0">
+          <a:scrgbClr r="0" g="0" b="0"/>
+        </a:fillRef>
+        <a:effectRef idx="0">
+          <a:scrgbClr r="0" g="0" b="0"/>
+        </a:effectRef>
+        <a:fontRef idx="minor"/>
+      </dsp:style>
+      <dsp:txBody>
+        <a:bodyPr spcFirstLastPara="0" vert="horz" wrap="square" lIns="12700" tIns="0" rIns="12700" bIns="0" numCol="1" spcCol="1270" anchor="ctr" anchorCtr="0">
+          <a:noAutofit/>
+        </a:bodyPr>
+        <a:lstStyle/>
+        <a:p>
+          <a:pPr lvl="0" algn="ctr" defTabSz="222250">
+            <a:lnSpc>
+              <a:spcPct val="90000"/>
+            </a:lnSpc>
+            <a:spcBef>
+              <a:spcPct val="0"/>
+            </a:spcBef>
+            <a:spcAft>
+              <a:spcPct val="35000"/>
+            </a:spcAft>
+          </a:pPr>
+          <a:endParaRPr lang="en-US" sz="500" kern="1200"/>
+        </a:p>
+      </dsp:txBody>
+      <dsp:txXfrm>
+        <a:off x="5544577" y="3177550"/>
+        <a:ext cx="27310" cy="5462"/>
+      </dsp:txXfrm>
+    </dsp:sp>
+    <dsp:sp modelId="{E0032F52-7C53-431C-B6E8-7CD6668EBE60}">
+      <dsp:nvSpPr>
+        <dsp:cNvPr id="0" name=""/>
+        <dsp:cNvSpPr/>
+      </dsp:nvSpPr>
+      <dsp:spPr>
+        <a:xfrm>
+          <a:off x="2927374" y="2467826"/>
+          <a:ext cx="2374850" cy="1424910"/>
+        </a:xfrm>
+        <a:prstGeom prst="rect">
+          <a:avLst/>
+        </a:prstGeom>
+        <a:solidFill>
+          <a:schemeClr val="dk2">
+            <a:hueOff val="0"/>
+            <a:satOff val="0"/>
+            <a:lumOff val="0"/>
+            <a:alphaOff val="0"/>
+          </a:schemeClr>
+        </a:solidFill>
+        <a:ln w="38100" cap="flat" cmpd="sng" algn="ctr">
+          <a:solidFill>
+            <a:schemeClr val="lt2">
+              <a:hueOff val="0"/>
+              <a:satOff val="0"/>
+              <a:lumOff val="0"/>
+              <a:alphaOff val="0"/>
+            </a:schemeClr>
+          </a:solidFill>
+          <a:prstDash val="solid"/>
+        </a:ln>
+        <a:effectLst>
+          <a:outerShdw blurRad="57150" dist="38100" dir="5400000" algn="ctr" rotWithShape="0">
+            <a:schemeClr val="dk2">
+              <a:hueOff val="0"/>
+              <a:satOff val="0"/>
+              <a:lumOff val="0"/>
+              <a:alphaOff val="0"/>
+              <a:shade val="9000"/>
+              <a:alpha val="48000"/>
+              <a:satMod val="105000"/>
+            </a:schemeClr>
+          </a:outerShdw>
+        </a:effectLst>
+      </dsp:spPr>
+      <dsp:style>
+        <a:lnRef idx="3">
+          <a:scrgbClr r="0" g="0" b="0"/>
+        </a:lnRef>
+        <a:fillRef idx="1">
+          <a:scrgbClr r="0" g="0" b="0"/>
+        </a:fillRef>
+        <a:effectRef idx="1">
+          <a:scrgbClr r="0" g="0" b="0"/>
+        </a:effectRef>
+        <a:fontRef idx="minor">
+          <a:schemeClr val="lt1"/>
+        </a:fontRef>
+      </dsp:style>
+      <dsp:txBody>
+        <a:bodyPr spcFirstLastPara="0" vert="horz" wrap="square" lIns="120904" tIns="120904" rIns="120904" bIns="120904" numCol="1" spcCol="1270" anchor="ctr" anchorCtr="0">
+          <a:noAutofit/>
+        </a:bodyPr>
+        <a:lstStyle/>
+        <a:p>
+          <a:pPr lvl="0" algn="ctr" defTabSz="755650">
+            <a:lnSpc>
+              <a:spcPct val="90000"/>
+            </a:lnSpc>
+            <a:spcBef>
+              <a:spcPct val="0"/>
+            </a:spcBef>
+            <a:spcAft>
+              <a:spcPct val="35000"/>
+            </a:spcAft>
+          </a:pPr>
+          <a:r>
+            <a:rPr lang="en-US" sz="1700" b="1" kern="1200" smtClean="0"/>
+            <a:t>Export Excel Report (Instructor &amp; Staff) </a:t>
+          </a:r>
+          <a:endParaRPr lang="en-US" sz="1700" b="1" kern="1200"/>
+        </a:p>
+      </dsp:txBody>
+      <dsp:txXfrm>
+        <a:off x="2927374" y="2467826"/>
+        <a:ext cx="2374850" cy="1424910"/>
+      </dsp:txXfrm>
+    </dsp:sp>
+    <dsp:sp modelId="{2FCD22A6-3CE8-4818-83A0-8E649A77CC9E}">
+      <dsp:nvSpPr>
+        <dsp:cNvPr id="0" name=""/>
+        <dsp:cNvSpPr/>
+      </dsp:nvSpPr>
+      <dsp:spPr>
+        <a:xfrm>
+          <a:off x="5848440" y="2467826"/>
+          <a:ext cx="2374850" cy="1424910"/>
         </a:xfrm>
         <a:prstGeom prst="rect">
           <a:avLst/>
@@ -14296,989 +14921,14 @@
           </a:pPr>
           <a:r>
             <a:rPr lang="en-US" sz="1700" kern="1200" smtClean="0"/>
-            <a:t>Check Attendance by Taking Picture</a:t>
+            <a:t>Manage Study Session. Sync Calendar to Google Calendar</a:t>
           </a:r>
           <a:endParaRPr lang="en-US" sz="1700" kern="1200"/>
         </a:p>
       </dsp:txBody>
       <dsp:txXfrm>
-        <a:off x="3145313" y="3679"/>
-        <a:ext cx="1938972" cy="1163383"/>
-      </dsp:txXfrm>
-    </dsp:sp>
-    <dsp:sp modelId="{B4AC2366-F8AE-4461-99B2-5962ABBC798E}">
-      <dsp:nvSpPr>
-        <dsp:cNvPr id="0" name=""/>
-        <dsp:cNvSpPr/>
-      </dsp:nvSpPr>
-      <dsp:spPr>
-        <a:xfrm>
-          <a:off x="1729864" y="1165263"/>
-          <a:ext cx="4769871" cy="415363"/>
-        </a:xfrm>
-        <a:custGeom>
-          <a:avLst/>
-          <a:gdLst/>
-          <a:ahLst/>
-          <a:cxnLst/>
-          <a:rect l="0" t="0" r="0" b="0"/>
-          <a:pathLst>
-            <a:path>
-              <a:moveTo>
-                <a:pt x="4769871" y="0"/>
-              </a:moveTo>
-              <a:lnTo>
-                <a:pt x="4769871" y="224781"/>
-              </a:lnTo>
-              <a:lnTo>
-                <a:pt x="0" y="224781"/>
-              </a:lnTo>
-              <a:lnTo>
-                <a:pt x="0" y="415363"/>
-              </a:lnTo>
-            </a:path>
-          </a:pathLst>
-        </a:custGeom>
-        <a:noFill/>
-        <a:ln w="9525" cap="flat" cmpd="sng" algn="ctr">
-          <a:solidFill>
-            <a:schemeClr val="dk2">
-              <a:hueOff val="0"/>
-              <a:satOff val="0"/>
-              <a:lumOff val="0"/>
-              <a:alphaOff val="0"/>
-            </a:schemeClr>
-          </a:solidFill>
-          <a:prstDash val="solid"/>
-          <a:tailEnd type="arrow"/>
-        </a:ln>
-        <a:effectLst/>
-      </dsp:spPr>
-      <dsp:style>
-        <a:lnRef idx="1">
-          <a:scrgbClr r="0" g="0" b="0"/>
-        </a:lnRef>
-        <a:fillRef idx="0">
-          <a:scrgbClr r="0" g="0" b="0"/>
-        </a:fillRef>
-        <a:effectRef idx="0">
-          <a:scrgbClr r="0" g="0" b="0"/>
-        </a:effectRef>
-        <a:fontRef idx="minor"/>
-      </dsp:style>
-      <dsp:txBody>
-        <a:bodyPr spcFirstLastPara="0" vert="horz" wrap="square" lIns="12700" tIns="0" rIns="12700" bIns="0" numCol="1" spcCol="1270" anchor="ctr" anchorCtr="0">
-          <a:noAutofit/>
-        </a:bodyPr>
-        <a:lstStyle/>
-        <a:p>
-          <a:pPr lvl="0" algn="ctr" defTabSz="222250">
-            <a:lnSpc>
-              <a:spcPct val="90000"/>
-            </a:lnSpc>
-            <a:spcBef>
-              <a:spcPct val="0"/>
-            </a:spcBef>
-            <a:spcAft>
-              <a:spcPct val="35000"/>
-            </a:spcAft>
-          </a:pPr>
-          <a:endParaRPr lang="en-US" sz="500" kern="1200"/>
-        </a:p>
-      </dsp:txBody>
-      <dsp:txXfrm>
-        <a:off x="3995033" y="1370713"/>
-        <a:ext cx="239533" cy="4463"/>
-      </dsp:txXfrm>
-    </dsp:sp>
-    <dsp:sp modelId="{1C2F4610-73CB-4146-AA09-F130EF591D97}">
-      <dsp:nvSpPr>
-        <dsp:cNvPr id="0" name=""/>
-        <dsp:cNvSpPr/>
-      </dsp:nvSpPr>
-      <dsp:spPr>
-        <a:xfrm>
-          <a:off x="5530249" y="3679"/>
-          <a:ext cx="1938972" cy="1163383"/>
-        </a:xfrm>
-        <a:prstGeom prst="rect">
-          <a:avLst/>
-        </a:prstGeom>
-        <a:solidFill>
-          <a:schemeClr val="dk2">
-            <a:hueOff val="0"/>
-            <a:satOff val="0"/>
-            <a:lumOff val="0"/>
-            <a:alphaOff val="0"/>
-          </a:schemeClr>
-        </a:solidFill>
-        <a:ln w="38100" cap="flat" cmpd="sng" algn="ctr">
-          <a:solidFill>
-            <a:schemeClr val="lt2">
-              <a:hueOff val="0"/>
-              <a:satOff val="0"/>
-              <a:lumOff val="0"/>
-              <a:alphaOff val="0"/>
-            </a:schemeClr>
-          </a:solidFill>
-          <a:prstDash val="solid"/>
-        </a:ln>
-        <a:effectLst>
-          <a:outerShdw blurRad="57150" dist="38100" dir="5400000" algn="ctr" rotWithShape="0">
-            <a:schemeClr val="dk2">
-              <a:hueOff val="0"/>
-              <a:satOff val="0"/>
-              <a:lumOff val="0"/>
-              <a:alphaOff val="0"/>
-              <a:shade val="9000"/>
-              <a:alpha val="48000"/>
-              <a:satMod val="105000"/>
-            </a:schemeClr>
-          </a:outerShdw>
-        </a:effectLst>
-      </dsp:spPr>
-      <dsp:style>
-        <a:lnRef idx="3">
-          <a:scrgbClr r="0" g="0" b="0"/>
-        </a:lnRef>
-        <a:fillRef idx="1">
-          <a:scrgbClr r="0" g="0" b="0"/>
-        </a:fillRef>
-        <a:effectRef idx="1">
-          <a:scrgbClr r="0" g="0" b="0"/>
-        </a:effectRef>
-        <a:fontRef idx="minor">
-          <a:schemeClr val="lt1"/>
-        </a:fontRef>
-      </dsp:style>
-      <dsp:txBody>
-        <a:bodyPr spcFirstLastPara="0" vert="horz" wrap="square" lIns="120904" tIns="120904" rIns="120904" bIns="120904" numCol="1" spcCol="1270" anchor="ctr" anchorCtr="0">
-          <a:noAutofit/>
-        </a:bodyPr>
-        <a:lstStyle/>
-        <a:p>
-          <a:pPr lvl="0" algn="ctr" defTabSz="755650">
-            <a:lnSpc>
-              <a:spcPct val="90000"/>
-            </a:lnSpc>
-            <a:spcBef>
-              <a:spcPct val="0"/>
-            </a:spcBef>
-            <a:spcAft>
-              <a:spcPct val="35000"/>
-            </a:spcAft>
-          </a:pPr>
-          <a:r>
-            <a:rPr lang="en-US" sz="1700" kern="1200" smtClean="0"/>
-            <a:t>Check Attendance Manually</a:t>
-          </a:r>
-        </a:p>
-        <a:p>
-          <a:pPr lvl="0" algn="ctr" defTabSz="755650">
-            <a:lnSpc>
-              <a:spcPct val="90000"/>
-            </a:lnSpc>
-            <a:spcBef>
-              <a:spcPct val="0"/>
-            </a:spcBef>
-            <a:spcAft>
-              <a:spcPct val="35000"/>
-            </a:spcAft>
-          </a:pPr>
-          <a:r>
-            <a:rPr lang="en-US" sz="1700" kern="1200" smtClean="0"/>
-            <a:t>(Web &amp; Mobile)</a:t>
-          </a:r>
-          <a:endParaRPr lang="en-US" sz="1700" kern="1200"/>
-        </a:p>
-      </dsp:txBody>
-      <dsp:txXfrm>
-        <a:off x="5530249" y="3679"/>
-        <a:ext cx="1938972" cy="1163383"/>
-      </dsp:txXfrm>
-    </dsp:sp>
-    <dsp:sp modelId="{D83FC0FD-C30E-47FD-B224-EEFE0690409D}">
-      <dsp:nvSpPr>
-        <dsp:cNvPr id="0" name=""/>
-        <dsp:cNvSpPr/>
-      </dsp:nvSpPr>
-      <dsp:spPr>
-        <a:xfrm>
-          <a:off x="2697550" y="2148998"/>
-          <a:ext cx="415363" cy="91440"/>
-        </a:xfrm>
-        <a:custGeom>
-          <a:avLst/>
-          <a:gdLst/>
-          <a:ahLst/>
-          <a:cxnLst/>
-          <a:rect l="0" t="0" r="0" b="0"/>
-          <a:pathLst>
-            <a:path>
-              <a:moveTo>
-                <a:pt x="0" y="45720"/>
-              </a:moveTo>
-              <a:lnTo>
-                <a:pt x="415363" y="45720"/>
-              </a:lnTo>
-            </a:path>
-          </a:pathLst>
-        </a:custGeom>
-        <a:noFill/>
-        <a:ln w="9525" cap="flat" cmpd="sng" algn="ctr">
-          <a:solidFill>
-            <a:schemeClr val="dk2">
-              <a:hueOff val="0"/>
-              <a:satOff val="0"/>
-              <a:lumOff val="0"/>
-              <a:alphaOff val="0"/>
-            </a:schemeClr>
-          </a:solidFill>
-          <a:prstDash val="solid"/>
-          <a:tailEnd type="arrow"/>
-        </a:ln>
-        <a:effectLst/>
-      </dsp:spPr>
-      <dsp:style>
-        <a:lnRef idx="1">
-          <a:scrgbClr r="0" g="0" b="0"/>
-        </a:lnRef>
-        <a:fillRef idx="0">
-          <a:scrgbClr r="0" g="0" b="0"/>
-        </a:fillRef>
-        <a:effectRef idx="0">
-          <a:scrgbClr r="0" g="0" b="0"/>
-        </a:effectRef>
-        <a:fontRef idx="minor"/>
-      </dsp:style>
-      <dsp:txBody>
-        <a:bodyPr spcFirstLastPara="0" vert="horz" wrap="square" lIns="12700" tIns="0" rIns="12700" bIns="0" numCol="1" spcCol="1270" anchor="ctr" anchorCtr="0">
-          <a:noAutofit/>
-        </a:bodyPr>
-        <a:lstStyle/>
-        <a:p>
-          <a:pPr lvl="0" algn="ctr" defTabSz="222250">
-            <a:lnSpc>
-              <a:spcPct val="90000"/>
-            </a:lnSpc>
-            <a:spcBef>
-              <a:spcPct val="0"/>
-            </a:spcBef>
-            <a:spcAft>
-              <a:spcPct val="35000"/>
-            </a:spcAft>
-          </a:pPr>
-          <a:endParaRPr lang="en-US" sz="500" kern="1200"/>
-        </a:p>
-      </dsp:txBody>
-      <dsp:txXfrm>
-        <a:off x="2894083" y="2192486"/>
-        <a:ext cx="22298" cy="4463"/>
-      </dsp:txXfrm>
-    </dsp:sp>
-    <dsp:sp modelId="{BBEA6F7A-DAB1-4AC1-B829-80681F3B19F5}">
-      <dsp:nvSpPr>
-        <dsp:cNvPr id="0" name=""/>
-        <dsp:cNvSpPr/>
-      </dsp:nvSpPr>
-      <dsp:spPr>
-        <a:xfrm>
-          <a:off x="760378" y="1613026"/>
-          <a:ext cx="1938972" cy="1163383"/>
-        </a:xfrm>
-        <a:prstGeom prst="rect">
-          <a:avLst/>
-        </a:prstGeom>
-        <a:solidFill>
-          <a:schemeClr val="dk2">
-            <a:hueOff val="0"/>
-            <a:satOff val="0"/>
-            <a:lumOff val="0"/>
-            <a:alphaOff val="0"/>
-          </a:schemeClr>
-        </a:solidFill>
-        <a:ln w="38100" cap="flat" cmpd="sng" algn="ctr">
-          <a:solidFill>
-            <a:schemeClr val="lt2">
-              <a:hueOff val="0"/>
-              <a:satOff val="0"/>
-              <a:lumOff val="0"/>
-              <a:alphaOff val="0"/>
-            </a:schemeClr>
-          </a:solidFill>
-          <a:prstDash val="solid"/>
-        </a:ln>
-        <a:effectLst>
-          <a:outerShdw blurRad="57150" dist="38100" dir="5400000" algn="ctr" rotWithShape="0">
-            <a:schemeClr val="dk2">
-              <a:hueOff val="0"/>
-              <a:satOff val="0"/>
-              <a:lumOff val="0"/>
-              <a:alphaOff val="0"/>
-              <a:shade val="9000"/>
-              <a:alpha val="48000"/>
-              <a:satMod val="105000"/>
-            </a:schemeClr>
-          </a:outerShdw>
-        </a:effectLst>
-      </dsp:spPr>
-      <dsp:style>
-        <a:lnRef idx="3">
-          <a:scrgbClr r="0" g="0" b="0"/>
-        </a:lnRef>
-        <a:fillRef idx="1">
-          <a:scrgbClr r="0" g="0" b="0"/>
-        </a:fillRef>
-        <a:effectRef idx="1">
-          <a:scrgbClr r="0" g="0" b="0"/>
-        </a:effectRef>
-        <a:fontRef idx="minor">
-          <a:schemeClr val="lt1"/>
-        </a:fontRef>
-      </dsp:style>
-      <dsp:txBody>
-        <a:bodyPr spcFirstLastPara="0" vert="horz" wrap="square" lIns="120904" tIns="120904" rIns="120904" bIns="120904" numCol="1" spcCol="1270" anchor="ctr" anchorCtr="0">
-          <a:noAutofit/>
-        </a:bodyPr>
-        <a:lstStyle/>
-        <a:p>
-          <a:pPr lvl="0" algn="ctr" defTabSz="755650">
-            <a:lnSpc>
-              <a:spcPct val="90000"/>
-            </a:lnSpc>
-            <a:spcBef>
-              <a:spcPct val="0"/>
-            </a:spcBef>
-            <a:spcAft>
-              <a:spcPct val="35000"/>
-            </a:spcAft>
-          </a:pPr>
-          <a:r>
-            <a:rPr lang="en-US" sz="1700" kern="1200" smtClean="0"/>
-            <a:t>Check Attendance Offline &amp; Sync Data Online</a:t>
-          </a:r>
-          <a:endParaRPr lang="en-US" sz="1700" kern="1200"/>
-        </a:p>
-      </dsp:txBody>
-      <dsp:txXfrm>
-        <a:off x="760378" y="1613026"/>
-        <a:ext cx="1938972" cy="1163383"/>
-      </dsp:txXfrm>
-    </dsp:sp>
-    <dsp:sp modelId="{55AE2ADC-7AC1-4C7A-97F0-578CEB96C95C}">
-      <dsp:nvSpPr>
-        <dsp:cNvPr id="0" name=""/>
-        <dsp:cNvSpPr/>
-      </dsp:nvSpPr>
-      <dsp:spPr>
-        <a:xfrm>
-          <a:off x="5082486" y="2148998"/>
-          <a:ext cx="415363" cy="91440"/>
-        </a:xfrm>
-        <a:custGeom>
-          <a:avLst/>
-          <a:gdLst/>
-          <a:ahLst/>
-          <a:cxnLst/>
-          <a:rect l="0" t="0" r="0" b="0"/>
-          <a:pathLst>
-            <a:path>
-              <a:moveTo>
-                <a:pt x="0" y="45720"/>
-              </a:moveTo>
-              <a:lnTo>
-                <a:pt x="415363" y="45720"/>
-              </a:lnTo>
-            </a:path>
-          </a:pathLst>
-        </a:custGeom>
-        <a:noFill/>
-        <a:ln w="9525" cap="flat" cmpd="sng" algn="ctr">
-          <a:solidFill>
-            <a:schemeClr val="dk2">
-              <a:hueOff val="0"/>
-              <a:satOff val="0"/>
-              <a:lumOff val="0"/>
-              <a:alphaOff val="0"/>
-            </a:schemeClr>
-          </a:solidFill>
-          <a:prstDash val="solid"/>
-          <a:tailEnd type="arrow"/>
-        </a:ln>
-        <a:effectLst/>
-      </dsp:spPr>
-      <dsp:style>
-        <a:lnRef idx="1">
-          <a:scrgbClr r="0" g="0" b="0"/>
-        </a:lnRef>
-        <a:fillRef idx="0">
-          <a:scrgbClr r="0" g="0" b="0"/>
-        </a:fillRef>
-        <a:effectRef idx="0">
-          <a:scrgbClr r="0" g="0" b="0"/>
-        </a:effectRef>
-        <a:fontRef idx="minor"/>
-      </dsp:style>
-      <dsp:txBody>
-        <a:bodyPr spcFirstLastPara="0" vert="horz" wrap="square" lIns="12700" tIns="0" rIns="12700" bIns="0" numCol="1" spcCol="1270" anchor="ctr" anchorCtr="0">
-          <a:noAutofit/>
-        </a:bodyPr>
-        <a:lstStyle/>
-        <a:p>
-          <a:pPr lvl="0" algn="ctr" defTabSz="222250">
-            <a:lnSpc>
-              <a:spcPct val="90000"/>
-            </a:lnSpc>
-            <a:spcBef>
-              <a:spcPct val="0"/>
-            </a:spcBef>
-            <a:spcAft>
-              <a:spcPct val="35000"/>
-            </a:spcAft>
-          </a:pPr>
-          <a:endParaRPr lang="en-US" sz="500" kern="1200"/>
-        </a:p>
-      </dsp:txBody>
-      <dsp:txXfrm>
-        <a:off x="5279018" y="2192486"/>
-        <a:ext cx="22298" cy="4463"/>
-      </dsp:txXfrm>
-    </dsp:sp>
-    <dsp:sp modelId="{E0032F52-7C53-431C-B6E8-7CD6668EBE60}">
-      <dsp:nvSpPr>
-        <dsp:cNvPr id="0" name=""/>
-        <dsp:cNvSpPr/>
-      </dsp:nvSpPr>
-      <dsp:spPr>
-        <a:xfrm>
-          <a:off x="3145313" y="1613026"/>
-          <a:ext cx="1938972" cy="1163383"/>
-        </a:xfrm>
-        <a:prstGeom prst="rect">
-          <a:avLst/>
-        </a:prstGeom>
-        <a:solidFill>
-          <a:schemeClr val="dk2">
-            <a:hueOff val="0"/>
-            <a:satOff val="0"/>
-            <a:lumOff val="0"/>
-            <a:alphaOff val="0"/>
-          </a:schemeClr>
-        </a:solidFill>
-        <a:ln w="38100" cap="flat" cmpd="sng" algn="ctr">
-          <a:solidFill>
-            <a:schemeClr val="lt2">
-              <a:hueOff val="0"/>
-              <a:satOff val="0"/>
-              <a:lumOff val="0"/>
-              <a:alphaOff val="0"/>
-            </a:schemeClr>
-          </a:solidFill>
-          <a:prstDash val="solid"/>
-        </a:ln>
-        <a:effectLst>
-          <a:outerShdw blurRad="57150" dist="38100" dir="5400000" algn="ctr" rotWithShape="0">
-            <a:schemeClr val="dk2">
-              <a:hueOff val="0"/>
-              <a:satOff val="0"/>
-              <a:lumOff val="0"/>
-              <a:alphaOff val="0"/>
-              <a:shade val="9000"/>
-              <a:alpha val="48000"/>
-              <a:satMod val="105000"/>
-            </a:schemeClr>
-          </a:outerShdw>
-        </a:effectLst>
-      </dsp:spPr>
-      <dsp:style>
-        <a:lnRef idx="3">
-          <a:scrgbClr r="0" g="0" b="0"/>
-        </a:lnRef>
-        <a:fillRef idx="1">
-          <a:scrgbClr r="0" g="0" b="0"/>
-        </a:fillRef>
-        <a:effectRef idx="1">
-          <a:scrgbClr r="0" g="0" b="0"/>
-        </a:effectRef>
-        <a:fontRef idx="minor">
-          <a:schemeClr val="lt1"/>
-        </a:fontRef>
-      </dsp:style>
-      <dsp:txBody>
-        <a:bodyPr spcFirstLastPara="0" vert="horz" wrap="square" lIns="120904" tIns="120904" rIns="120904" bIns="120904" numCol="1" spcCol="1270" anchor="ctr" anchorCtr="0">
-          <a:noAutofit/>
-        </a:bodyPr>
-        <a:lstStyle/>
-        <a:p>
-          <a:pPr lvl="0" algn="ctr" defTabSz="755650">
-            <a:lnSpc>
-              <a:spcPct val="90000"/>
-            </a:lnSpc>
-            <a:spcBef>
-              <a:spcPct val="0"/>
-            </a:spcBef>
-            <a:spcAft>
-              <a:spcPct val="35000"/>
-            </a:spcAft>
-          </a:pPr>
-          <a:r>
-            <a:rPr lang="en-US" sz="1700" kern="1200" smtClean="0"/>
-            <a:t>Export Excel Report (Instructor &amp; Staff) </a:t>
-          </a:r>
-          <a:endParaRPr lang="en-US" sz="1700" kern="1200"/>
-        </a:p>
-      </dsp:txBody>
-      <dsp:txXfrm>
-        <a:off x="3145313" y="1613026"/>
-        <a:ext cx="1938972" cy="1163383"/>
-      </dsp:txXfrm>
-    </dsp:sp>
-    <dsp:sp modelId="{64DFBA7B-8B4F-4150-8EAB-C574E26C78EB}">
-      <dsp:nvSpPr>
-        <dsp:cNvPr id="0" name=""/>
-        <dsp:cNvSpPr/>
-      </dsp:nvSpPr>
-      <dsp:spPr>
-        <a:xfrm>
-          <a:off x="1729864" y="2774610"/>
-          <a:ext cx="4769871" cy="415363"/>
-        </a:xfrm>
-        <a:custGeom>
-          <a:avLst/>
-          <a:gdLst/>
-          <a:ahLst/>
-          <a:cxnLst/>
-          <a:rect l="0" t="0" r="0" b="0"/>
-          <a:pathLst>
-            <a:path>
-              <a:moveTo>
-                <a:pt x="4769871" y="0"/>
-              </a:moveTo>
-              <a:lnTo>
-                <a:pt x="4769871" y="224781"/>
-              </a:lnTo>
-              <a:lnTo>
-                <a:pt x="0" y="224781"/>
-              </a:lnTo>
-              <a:lnTo>
-                <a:pt x="0" y="415363"/>
-              </a:lnTo>
-            </a:path>
-          </a:pathLst>
-        </a:custGeom>
-        <a:noFill/>
-        <a:ln w="9525" cap="flat" cmpd="sng" algn="ctr">
-          <a:solidFill>
-            <a:schemeClr val="dk2">
-              <a:hueOff val="0"/>
-              <a:satOff val="0"/>
-              <a:lumOff val="0"/>
-              <a:alphaOff val="0"/>
-            </a:schemeClr>
-          </a:solidFill>
-          <a:prstDash val="solid"/>
-          <a:tailEnd type="arrow"/>
-        </a:ln>
-        <a:effectLst/>
-      </dsp:spPr>
-      <dsp:style>
-        <a:lnRef idx="1">
-          <a:scrgbClr r="0" g="0" b="0"/>
-        </a:lnRef>
-        <a:fillRef idx="0">
-          <a:scrgbClr r="0" g="0" b="0"/>
-        </a:fillRef>
-        <a:effectRef idx="0">
-          <a:scrgbClr r="0" g="0" b="0"/>
-        </a:effectRef>
-        <a:fontRef idx="minor"/>
-      </dsp:style>
-      <dsp:txBody>
-        <a:bodyPr spcFirstLastPara="0" vert="horz" wrap="square" lIns="12700" tIns="0" rIns="12700" bIns="0" numCol="1" spcCol="1270" anchor="ctr" anchorCtr="0">
-          <a:noAutofit/>
-        </a:bodyPr>
-        <a:lstStyle/>
-        <a:p>
-          <a:pPr lvl="0" algn="ctr" defTabSz="222250">
-            <a:lnSpc>
-              <a:spcPct val="90000"/>
-            </a:lnSpc>
-            <a:spcBef>
-              <a:spcPct val="0"/>
-            </a:spcBef>
-            <a:spcAft>
-              <a:spcPct val="35000"/>
-            </a:spcAft>
-          </a:pPr>
-          <a:endParaRPr lang="en-US" sz="500" kern="1200"/>
-        </a:p>
-      </dsp:txBody>
-      <dsp:txXfrm>
-        <a:off x="3995033" y="2980059"/>
-        <a:ext cx="239533" cy="4463"/>
-      </dsp:txXfrm>
-    </dsp:sp>
-    <dsp:sp modelId="{2FCD22A6-3CE8-4818-83A0-8E649A77CC9E}">
-      <dsp:nvSpPr>
-        <dsp:cNvPr id="0" name=""/>
-        <dsp:cNvSpPr/>
-      </dsp:nvSpPr>
-      <dsp:spPr>
-        <a:xfrm>
-          <a:off x="5530249" y="1613026"/>
-          <a:ext cx="1938972" cy="1163383"/>
-        </a:xfrm>
-        <a:prstGeom prst="rect">
-          <a:avLst/>
-        </a:prstGeom>
-        <a:solidFill>
-          <a:schemeClr val="dk2">
-            <a:hueOff val="0"/>
-            <a:satOff val="0"/>
-            <a:lumOff val="0"/>
-            <a:alphaOff val="0"/>
-          </a:schemeClr>
-        </a:solidFill>
-        <a:ln w="38100" cap="flat" cmpd="sng" algn="ctr">
-          <a:solidFill>
-            <a:schemeClr val="lt2">
-              <a:hueOff val="0"/>
-              <a:satOff val="0"/>
-              <a:lumOff val="0"/>
-              <a:alphaOff val="0"/>
-            </a:schemeClr>
-          </a:solidFill>
-          <a:prstDash val="solid"/>
-        </a:ln>
-        <a:effectLst>
-          <a:outerShdw blurRad="57150" dist="38100" dir="5400000" algn="ctr" rotWithShape="0">
-            <a:schemeClr val="dk2">
-              <a:hueOff val="0"/>
-              <a:satOff val="0"/>
-              <a:lumOff val="0"/>
-              <a:alphaOff val="0"/>
-              <a:shade val="9000"/>
-              <a:alpha val="48000"/>
-              <a:satMod val="105000"/>
-            </a:schemeClr>
-          </a:outerShdw>
-        </a:effectLst>
-      </dsp:spPr>
-      <dsp:style>
-        <a:lnRef idx="3">
-          <a:scrgbClr r="0" g="0" b="0"/>
-        </a:lnRef>
-        <a:fillRef idx="1">
-          <a:scrgbClr r="0" g="0" b="0"/>
-        </a:fillRef>
-        <a:effectRef idx="1">
-          <a:scrgbClr r="0" g="0" b="0"/>
-        </a:effectRef>
-        <a:fontRef idx="minor">
-          <a:schemeClr val="lt1"/>
-        </a:fontRef>
-      </dsp:style>
-      <dsp:txBody>
-        <a:bodyPr spcFirstLastPara="0" vert="horz" wrap="square" lIns="120904" tIns="120904" rIns="120904" bIns="120904" numCol="1" spcCol="1270" anchor="ctr" anchorCtr="0">
-          <a:noAutofit/>
-        </a:bodyPr>
-        <a:lstStyle/>
-        <a:p>
-          <a:pPr lvl="0" algn="ctr" defTabSz="755650">
-            <a:lnSpc>
-              <a:spcPct val="90000"/>
-            </a:lnSpc>
-            <a:spcBef>
-              <a:spcPct val="0"/>
-            </a:spcBef>
-            <a:spcAft>
-              <a:spcPct val="35000"/>
-            </a:spcAft>
-          </a:pPr>
-          <a:r>
-            <a:rPr lang="en-US" sz="1700" kern="1200" smtClean="0"/>
-            <a:t>Add Student Image into System (Upload Images, use Log)</a:t>
-          </a:r>
-          <a:endParaRPr lang="en-US" sz="1700" kern="1200"/>
-        </a:p>
-      </dsp:txBody>
-      <dsp:txXfrm>
-        <a:off x="5530249" y="1613026"/>
-        <a:ext cx="1938972" cy="1163383"/>
-      </dsp:txXfrm>
-    </dsp:sp>
-    <dsp:sp modelId="{838C2C4D-9403-4F20-9AC1-8B210DB5B5E0}">
-      <dsp:nvSpPr>
-        <dsp:cNvPr id="0" name=""/>
-        <dsp:cNvSpPr/>
-      </dsp:nvSpPr>
-      <dsp:spPr>
-        <a:xfrm>
-          <a:off x="2697550" y="3758345"/>
-          <a:ext cx="415363" cy="91440"/>
-        </a:xfrm>
-        <a:custGeom>
-          <a:avLst/>
-          <a:gdLst/>
-          <a:ahLst/>
-          <a:cxnLst/>
-          <a:rect l="0" t="0" r="0" b="0"/>
-          <a:pathLst>
-            <a:path>
-              <a:moveTo>
-                <a:pt x="0" y="45720"/>
-              </a:moveTo>
-              <a:lnTo>
-                <a:pt x="415363" y="45720"/>
-              </a:lnTo>
-            </a:path>
-          </a:pathLst>
-        </a:custGeom>
-        <a:noFill/>
-        <a:ln w="9525" cap="flat" cmpd="sng" algn="ctr">
-          <a:solidFill>
-            <a:schemeClr val="dk2">
-              <a:hueOff val="0"/>
-              <a:satOff val="0"/>
-              <a:lumOff val="0"/>
-              <a:alphaOff val="0"/>
-            </a:schemeClr>
-          </a:solidFill>
-          <a:prstDash val="solid"/>
-          <a:tailEnd type="arrow"/>
-        </a:ln>
-        <a:effectLst/>
-      </dsp:spPr>
-      <dsp:style>
-        <a:lnRef idx="1">
-          <a:scrgbClr r="0" g="0" b="0"/>
-        </a:lnRef>
-        <a:fillRef idx="0">
-          <a:scrgbClr r="0" g="0" b="0"/>
-        </a:fillRef>
-        <a:effectRef idx="0">
-          <a:scrgbClr r="0" g="0" b="0"/>
-        </a:effectRef>
-        <a:fontRef idx="minor"/>
-      </dsp:style>
-      <dsp:txBody>
-        <a:bodyPr spcFirstLastPara="0" vert="horz" wrap="square" lIns="12700" tIns="0" rIns="12700" bIns="0" numCol="1" spcCol="1270" anchor="ctr" anchorCtr="0">
-          <a:noAutofit/>
-        </a:bodyPr>
-        <a:lstStyle/>
-        <a:p>
-          <a:pPr lvl="0" algn="ctr" defTabSz="222250">
-            <a:lnSpc>
-              <a:spcPct val="90000"/>
-            </a:lnSpc>
-            <a:spcBef>
-              <a:spcPct val="0"/>
-            </a:spcBef>
-            <a:spcAft>
-              <a:spcPct val="35000"/>
-            </a:spcAft>
-          </a:pPr>
-          <a:endParaRPr lang="en-US" sz="500" kern="1200"/>
-        </a:p>
-      </dsp:txBody>
-      <dsp:txXfrm>
-        <a:off x="2894083" y="3801833"/>
-        <a:ext cx="22298" cy="4463"/>
-      </dsp:txXfrm>
-    </dsp:sp>
-    <dsp:sp modelId="{166416FB-B4ED-415F-8781-4FC7E9101CD5}">
-      <dsp:nvSpPr>
-        <dsp:cNvPr id="0" name=""/>
-        <dsp:cNvSpPr/>
-      </dsp:nvSpPr>
-      <dsp:spPr>
-        <a:xfrm>
-          <a:off x="760378" y="3222373"/>
-          <a:ext cx="1938972" cy="1163383"/>
-        </a:xfrm>
-        <a:prstGeom prst="rect">
-          <a:avLst/>
-        </a:prstGeom>
-        <a:solidFill>
-          <a:schemeClr val="dk2">
-            <a:hueOff val="0"/>
-            <a:satOff val="0"/>
-            <a:lumOff val="0"/>
-            <a:alphaOff val="0"/>
-          </a:schemeClr>
-        </a:solidFill>
-        <a:ln w="38100" cap="flat" cmpd="sng" algn="ctr">
-          <a:solidFill>
-            <a:schemeClr val="lt2">
-              <a:hueOff val="0"/>
-              <a:satOff val="0"/>
-              <a:lumOff val="0"/>
-              <a:alphaOff val="0"/>
-            </a:schemeClr>
-          </a:solidFill>
-          <a:prstDash val="solid"/>
-        </a:ln>
-        <a:effectLst>
-          <a:outerShdw blurRad="57150" dist="38100" dir="5400000" algn="ctr" rotWithShape="0">
-            <a:schemeClr val="dk2">
-              <a:hueOff val="0"/>
-              <a:satOff val="0"/>
-              <a:lumOff val="0"/>
-              <a:alphaOff val="0"/>
-              <a:shade val="9000"/>
-              <a:alpha val="48000"/>
-              <a:satMod val="105000"/>
-            </a:schemeClr>
-          </a:outerShdw>
-        </a:effectLst>
-      </dsp:spPr>
-      <dsp:style>
-        <a:lnRef idx="3">
-          <a:scrgbClr r="0" g="0" b="0"/>
-        </a:lnRef>
-        <a:fillRef idx="1">
-          <a:scrgbClr r="0" g="0" b="0"/>
-        </a:fillRef>
-        <a:effectRef idx="1">
-          <a:scrgbClr r="0" g="0" b="0"/>
-        </a:effectRef>
-        <a:fontRef idx="minor">
-          <a:schemeClr val="lt1"/>
-        </a:fontRef>
-      </dsp:style>
-      <dsp:txBody>
-        <a:bodyPr spcFirstLastPara="0" vert="horz" wrap="square" lIns="120904" tIns="120904" rIns="120904" bIns="120904" numCol="1" spcCol="1270" anchor="ctr" anchorCtr="0">
-          <a:noAutofit/>
-        </a:bodyPr>
-        <a:lstStyle/>
-        <a:p>
-          <a:pPr lvl="0" algn="ctr" defTabSz="755650">
-            <a:lnSpc>
-              <a:spcPct val="90000"/>
-            </a:lnSpc>
-            <a:spcBef>
-              <a:spcPct val="0"/>
-            </a:spcBef>
-            <a:spcAft>
-              <a:spcPct val="35000"/>
-            </a:spcAft>
-          </a:pPr>
-          <a:r>
-            <a:rPr lang="en-US" sz="1700" kern="1200" smtClean="0"/>
-            <a:t>Manage Roll Call, Study Session</a:t>
-          </a:r>
-        </a:p>
-        <a:p>
-          <a:pPr lvl="0" algn="ctr" defTabSz="755650">
-            <a:lnSpc>
-              <a:spcPct val="90000"/>
-            </a:lnSpc>
-            <a:spcBef>
-              <a:spcPct val="0"/>
-            </a:spcBef>
-            <a:spcAft>
-              <a:spcPct val="35000"/>
-            </a:spcAft>
-          </a:pPr>
-          <a:r>
-            <a:rPr lang="en-US" sz="1700" kern="1200" smtClean="0"/>
-            <a:t>(Change Time &amp; Instructor)</a:t>
-          </a:r>
-          <a:endParaRPr lang="en-US" sz="1700" kern="1200"/>
-        </a:p>
-      </dsp:txBody>
-      <dsp:txXfrm>
-        <a:off x="760378" y="3222373"/>
-        <a:ext cx="1938972" cy="1163383"/>
-      </dsp:txXfrm>
-    </dsp:sp>
-    <dsp:sp modelId="{FEFC772D-60C1-4286-8CD7-3222525D0477}">
-      <dsp:nvSpPr>
-        <dsp:cNvPr id="0" name=""/>
-        <dsp:cNvSpPr/>
-      </dsp:nvSpPr>
-      <dsp:spPr>
-        <a:xfrm>
-          <a:off x="3145313" y="3222373"/>
-          <a:ext cx="1938972" cy="1163383"/>
-        </a:xfrm>
-        <a:prstGeom prst="rect">
-          <a:avLst/>
-        </a:prstGeom>
-        <a:solidFill>
-          <a:schemeClr val="dk2">
-            <a:hueOff val="0"/>
-            <a:satOff val="0"/>
-            <a:lumOff val="0"/>
-            <a:alphaOff val="0"/>
-          </a:schemeClr>
-        </a:solidFill>
-        <a:ln w="38100" cap="flat" cmpd="sng" algn="ctr">
-          <a:solidFill>
-            <a:schemeClr val="lt2">
-              <a:hueOff val="0"/>
-              <a:satOff val="0"/>
-              <a:lumOff val="0"/>
-              <a:alphaOff val="0"/>
-            </a:schemeClr>
-          </a:solidFill>
-          <a:prstDash val="solid"/>
-        </a:ln>
-        <a:effectLst>
-          <a:outerShdw blurRad="57150" dist="38100" dir="5400000" algn="ctr" rotWithShape="0">
-            <a:schemeClr val="dk2">
-              <a:hueOff val="0"/>
-              <a:satOff val="0"/>
-              <a:lumOff val="0"/>
-              <a:alphaOff val="0"/>
-              <a:shade val="9000"/>
-              <a:alpha val="48000"/>
-              <a:satMod val="105000"/>
-            </a:schemeClr>
-          </a:outerShdw>
-        </a:effectLst>
-      </dsp:spPr>
-      <dsp:style>
-        <a:lnRef idx="3">
-          <a:scrgbClr r="0" g="0" b="0"/>
-        </a:lnRef>
-        <a:fillRef idx="1">
-          <a:scrgbClr r="0" g="0" b="0"/>
-        </a:fillRef>
-        <a:effectRef idx="1">
-          <a:scrgbClr r="0" g="0" b="0"/>
-        </a:effectRef>
-        <a:fontRef idx="minor">
-          <a:schemeClr val="lt1"/>
-        </a:fontRef>
-      </dsp:style>
-      <dsp:txBody>
-        <a:bodyPr spcFirstLastPara="0" vert="horz" wrap="square" lIns="128016" tIns="128016" rIns="128016" bIns="128016" numCol="1" spcCol="1270" anchor="ctr" anchorCtr="0">
-          <a:noAutofit/>
-        </a:bodyPr>
-        <a:lstStyle/>
-        <a:p>
-          <a:pPr lvl="0" algn="ctr" defTabSz="800100">
-            <a:lnSpc>
-              <a:spcPct val="90000"/>
-            </a:lnSpc>
-            <a:spcBef>
-              <a:spcPct val="0"/>
-            </a:spcBef>
-            <a:spcAft>
-              <a:spcPct val="35000"/>
-            </a:spcAft>
-          </a:pPr>
-          <a:r>
-            <a:rPr lang="en-US" sz="1800" kern="1200" smtClean="0"/>
-            <a:t>Sync Teaching Calendar to Google Calendar</a:t>
-          </a:r>
-          <a:endParaRPr lang="en-US" sz="1800" kern="1200"/>
-        </a:p>
-      </dsp:txBody>
-      <dsp:txXfrm>
-        <a:off x="3145313" y="3222373"/>
-        <a:ext cx="1938972" cy="1163383"/>
+        <a:off x="5848440" y="2467826"/>
+        <a:ext cx="2374850" cy="1424910"/>
       </dsp:txXfrm>
     </dsp:sp>
   </dsp:spTree>
@@ -26767,7 +26417,7 @@
             <a:fld id="{1D8BD707-D9CF-40AE-B4C6-C98DA3205C09}" type="datetimeFigureOut">
               <a:rPr lang="en-US" smtClean="0"/>
               <a:pPr/>
-              <a:t>11/23/2013</a:t>
+              <a:t>11/28/2013</a:t>
             </a:fld>
             <a:endParaRPr lang="en-US"/>
           </a:p>
@@ -26934,7 +26584,7 @@
             <a:fld id="{1D8BD707-D9CF-40AE-B4C6-C98DA3205C09}" type="datetimeFigureOut">
               <a:rPr lang="en-US" smtClean="0"/>
               <a:pPr/>
-              <a:t>11/23/2013</a:t>
+              <a:t>11/28/2013</a:t>
             </a:fld>
             <a:endParaRPr lang="en-US"/>
           </a:p>
@@ -27111,7 +26761,7 @@
             <a:fld id="{1D8BD707-D9CF-40AE-B4C6-C98DA3205C09}" type="datetimeFigureOut">
               <a:rPr lang="en-US" smtClean="0"/>
               <a:pPr/>
-              <a:t>11/23/2013</a:t>
+              <a:t>11/28/2013</a:t>
             </a:fld>
             <a:endParaRPr lang="en-US"/>
           </a:p>
@@ -27278,7 +26928,7 @@
             <a:fld id="{1D8BD707-D9CF-40AE-B4C6-C98DA3205C09}" type="datetimeFigureOut">
               <a:rPr lang="en-US" smtClean="0"/>
               <a:pPr/>
-              <a:t>11/23/2013</a:t>
+              <a:t>11/28/2013</a:t>
             </a:fld>
             <a:endParaRPr lang="en-US"/>
           </a:p>
@@ -27522,7 +27172,7 @@
             <a:fld id="{1D8BD707-D9CF-40AE-B4C6-C98DA3205C09}" type="datetimeFigureOut">
               <a:rPr lang="en-US" smtClean="0"/>
               <a:pPr/>
-              <a:t>11/23/2013</a:t>
+              <a:t>11/28/2013</a:t>
             </a:fld>
             <a:endParaRPr lang="en-US"/>
           </a:p>
@@ -27788,7 +27438,7 @@
             <a:fld id="{1D8BD707-D9CF-40AE-B4C6-C98DA3205C09}" type="datetimeFigureOut">
               <a:rPr lang="en-US" smtClean="0"/>
               <a:pPr/>
-              <a:t>11/23/2013</a:t>
+              <a:t>11/28/2013</a:t>
             </a:fld>
             <a:endParaRPr lang="en-US"/>
           </a:p>
@@ -28168,7 +27818,7 @@
             <a:fld id="{1D8BD707-D9CF-40AE-B4C6-C98DA3205C09}" type="datetimeFigureOut">
               <a:rPr lang="en-US" smtClean="0"/>
               <a:pPr/>
-              <a:t>11/23/2013</a:t>
+              <a:t>11/28/2013</a:t>
             </a:fld>
             <a:endParaRPr lang="en-US"/>
           </a:p>
@@ -28320,7 +27970,7 @@
             <a:fld id="{1D8BD707-D9CF-40AE-B4C6-C98DA3205C09}" type="datetimeFigureOut">
               <a:rPr lang="en-US" smtClean="0"/>
               <a:pPr/>
-              <a:t>11/23/2013</a:t>
+              <a:t>11/28/2013</a:t>
             </a:fld>
             <a:endParaRPr lang="en-US"/>
           </a:p>
@@ -28412,7 +28062,7 @@
             <a:fld id="{1D8BD707-D9CF-40AE-B4C6-C98DA3205C09}" type="datetimeFigureOut">
               <a:rPr lang="en-US" smtClean="0"/>
               <a:pPr/>
-              <a:t>11/23/2013</a:t>
+              <a:t>11/28/2013</a:t>
             </a:fld>
             <a:endParaRPr lang="en-US"/>
           </a:p>
@@ -28675,7 +28325,7 @@
             <a:fld id="{1D8BD707-D9CF-40AE-B4C6-C98DA3205C09}" type="datetimeFigureOut">
               <a:rPr lang="en-US" smtClean="0"/>
               <a:pPr/>
-              <a:t>11/23/2013</a:t>
+              <a:t>11/28/2013</a:t>
             </a:fld>
             <a:endParaRPr lang="en-US"/>
           </a:p>
@@ -28965,7 +28615,7 @@
             <a:fld id="{1D8BD707-D9CF-40AE-B4C6-C98DA3205C09}" type="datetimeFigureOut">
               <a:rPr lang="en-US" smtClean="0"/>
               <a:pPr/>
-              <a:t>11/23/2013</a:t>
+              <a:t>11/28/2013</a:t>
             </a:fld>
             <a:endParaRPr lang="en-US"/>
           </a:p>
@@ -29738,7 +29388,7 @@
             <a:fld id="{1D8BD707-D9CF-40AE-B4C6-C98DA3205C09}" type="datetimeFigureOut">
               <a:rPr lang="en-US" smtClean="0"/>
               <a:pPr/>
-              <a:t>11/23/2013</a:t>
+              <a:t>11/28/2013</a:t>
             </a:fld>
             <a:endParaRPr lang="en-US"/>
           </a:p>
@@ -30478,7 +30128,7 @@
             <p:ph idx="1"/>
             <p:extLst>
               <p:ext uri="{D42A27DB-BD31-4B8C-83A1-F6EECF244321}">
-                <p14:modId xmlns:p14="http://schemas.microsoft.com/office/powerpoint/2010/main" val="2753724020"/>
+                <p14:modId xmlns:p14="http://schemas.microsoft.com/office/powerpoint/2010/main" val="1682506052"/>
               </p:ext>
             </p:extLst>
           </p:nvPr>
@@ -30634,6 +30284,827 @@
           <a:p>
             <a:r>
               <a:rPr lang="en-US" smtClean="0"/>
+              <a:t>Check Attendance Auto</a:t>
+            </a:r>
+            <a:endParaRPr lang="en-US"/>
+          </a:p>
+        </p:txBody>
+      </p:sp>
+      <p:pic>
+        <p:nvPicPr>
+          <p:cNvPr id="4" name="Picture 4" descr="graduated icon"/>
+          <p:cNvPicPr>
+            <a:picLocks noChangeAspect="1" noChangeArrowheads="1"/>
+          </p:cNvPicPr>
+          <p:nvPr/>
+        </p:nvPicPr>
+        <p:blipFill>
+          <a:blip r:embed="rId2" cstate="print">
+            <a:extLst>
+              <a:ext uri="{28A0092B-C50C-407E-A947-70E740481C1C}">
+                <a14:useLocalDpi xmlns:a14="http://schemas.microsoft.com/office/drawing/2010/main" val="0"/>
+              </a:ext>
+            </a:extLst>
+          </a:blip>
+          <a:srcRect/>
+          <a:stretch>
+            <a:fillRect/>
+          </a:stretch>
+        </p:blipFill>
+        <p:spPr bwMode="auto">
+          <a:xfrm>
+            <a:off x="2802813" y="4606049"/>
+            <a:ext cx="626052" cy="626052"/>
+          </a:xfrm>
+          <a:prstGeom prst="rect">
+            <a:avLst/>
+          </a:prstGeom>
+          <a:noFill/>
+          <a:extLst>
+            <a:ext uri="{909E8E84-426E-40DD-AFC4-6F175D3DCCD1}">
+              <a14:hiddenFill xmlns:a14="http://schemas.microsoft.com/office/drawing/2010/main">
+                <a:solidFill>
+                  <a:srgbClr val="FFFFFF"/>
+                </a:solidFill>
+              </a14:hiddenFill>
+            </a:ext>
+          </a:extLst>
+        </p:spPr>
+      </p:pic>
+      <p:pic>
+        <p:nvPicPr>
+          <p:cNvPr id="5" name="Picture 4" descr="graduated icon"/>
+          <p:cNvPicPr>
+            <a:picLocks noChangeAspect="1" noChangeArrowheads="1"/>
+          </p:cNvPicPr>
+          <p:nvPr/>
+        </p:nvPicPr>
+        <p:blipFill>
+          <a:blip r:embed="rId2" cstate="print">
+            <a:extLst>
+              <a:ext uri="{28A0092B-C50C-407E-A947-70E740481C1C}">
+                <a14:useLocalDpi xmlns:a14="http://schemas.microsoft.com/office/drawing/2010/main" val="0"/>
+              </a:ext>
+            </a:extLst>
+          </a:blip>
+          <a:srcRect/>
+          <a:stretch>
+            <a:fillRect/>
+          </a:stretch>
+        </p:blipFill>
+        <p:spPr bwMode="auto">
+          <a:xfrm>
+            <a:off x="1875523" y="4860031"/>
+            <a:ext cx="626052" cy="626052"/>
+          </a:xfrm>
+          <a:prstGeom prst="rect">
+            <a:avLst/>
+          </a:prstGeom>
+          <a:noFill/>
+          <a:extLst>
+            <a:ext uri="{909E8E84-426E-40DD-AFC4-6F175D3DCCD1}">
+              <a14:hiddenFill xmlns:a14="http://schemas.microsoft.com/office/drawing/2010/main">
+                <a:solidFill>
+                  <a:srgbClr val="FFFFFF"/>
+                </a:solidFill>
+              </a14:hiddenFill>
+            </a:ext>
+          </a:extLst>
+        </p:spPr>
+      </p:pic>
+      <p:sp>
+        <p:nvSpPr>
+          <p:cNvPr id="6" name="Right Arrow 5"/>
+          <p:cNvSpPr/>
+          <p:nvPr/>
+        </p:nvSpPr>
+        <p:spPr>
+          <a:xfrm flipV="1">
+            <a:off x="1315032" y="2908151"/>
+            <a:ext cx="992124" cy="258663"/>
+          </a:xfrm>
+          <a:prstGeom prst="rightArrow">
+            <a:avLst/>
+          </a:prstGeom>
+        </p:spPr>
+        <p:style>
+          <a:lnRef idx="2">
+            <a:schemeClr val="accent1">
+              <a:shade val="50000"/>
+            </a:schemeClr>
+          </a:lnRef>
+          <a:fillRef idx="1">
+            <a:schemeClr val="accent1"/>
+          </a:fillRef>
+          <a:effectRef idx="0">
+            <a:schemeClr val="accent1"/>
+          </a:effectRef>
+          <a:fontRef idx="minor">
+            <a:schemeClr val="lt1"/>
+          </a:fontRef>
+        </p:style>
+        <p:txBody>
+          <a:bodyPr rtlCol="0" anchor="ctr"/>
+          <a:lstStyle/>
+          <a:p>
+            <a:pPr algn="ctr"/>
+            <a:endParaRPr lang="en-US"/>
+          </a:p>
+        </p:txBody>
+      </p:sp>
+      <p:pic>
+        <p:nvPicPr>
+          <p:cNvPr id="7" name="Picture 4" descr="graduated icon"/>
+          <p:cNvPicPr>
+            <a:picLocks noChangeAspect="1" noChangeArrowheads="1"/>
+          </p:cNvPicPr>
+          <p:nvPr/>
+        </p:nvPicPr>
+        <p:blipFill>
+          <a:blip r:embed="rId2" cstate="print">
+            <a:extLst>
+              <a:ext uri="{28A0092B-C50C-407E-A947-70E740481C1C}">
+                <a14:useLocalDpi xmlns:a14="http://schemas.microsoft.com/office/drawing/2010/main" val="0"/>
+              </a:ext>
+            </a:extLst>
+          </a:blip>
+          <a:srcRect/>
+          <a:stretch>
+            <a:fillRect/>
+          </a:stretch>
+        </p:blipFill>
+        <p:spPr bwMode="auto">
+          <a:xfrm>
+            <a:off x="2227120" y="4593977"/>
+            <a:ext cx="626052" cy="626052"/>
+          </a:xfrm>
+          <a:prstGeom prst="rect">
+            <a:avLst/>
+          </a:prstGeom>
+          <a:noFill/>
+          <a:extLst>
+            <a:ext uri="{909E8E84-426E-40DD-AFC4-6F175D3DCCD1}">
+              <a14:hiddenFill xmlns:a14="http://schemas.microsoft.com/office/drawing/2010/main">
+                <a:solidFill>
+                  <a:srgbClr val="FFFFFF"/>
+                </a:solidFill>
+              </a14:hiddenFill>
+            </a:ext>
+          </a:extLst>
+        </p:spPr>
+      </p:pic>
+      <p:pic>
+        <p:nvPicPr>
+          <p:cNvPr id="8" name="Picture 4" descr="graduated icon"/>
+          <p:cNvPicPr>
+            <a:picLocks noChangeAspect="1" noChangeArrowheads="1"/>
+          </p:cNvPicPr>
+          <p:nvPr/>
+        </p:nvPicPr>
+        <p:blipFill>
+          <a:blip r:embed="rId2" cstate="print">
+            <a:extLst>
+              <a:ext uri="{28A0092B-C50C-407E-A947-70E740481C1C}">
+                <a14:useLocalDpi xmlns:a14="http://schemas.microsoft.com/office/drawing/2010/main" val="0"/>
+              </a:ext>
+            </a:extLst>
+          </a:blip>
+          <a:srcRect/>
+          <a:stretch>
+            <a:fillRect/>
+          </a:stretch>
+        </p:blipFill>
+        <p:spPr bwMode="auto">
+          <a:xfrm>
+            <a:off x="2489787" y="4811605"/>
+            <a:ext cx="626052" cy="626052"/>
+          </a:xfrm>
+          <a:prstGeom prst="rect">
+            <a:avLst/>
+          </a:prstGeom>
+          <a:noFill/>
+          <a:extLst>
+            <a:ext uri="{909E8E84-426E-40DD-AFC4-6F175D3DCCD1}">
+              <a14:hiddenFill xmlns:a14="http://schemas.microsoft.com/office/drawing/2010/main">
+                <a:solidFill>
+                  <a:srgbClr val="FFFFFF"/>
+                </a:solidFill>
+              </a14:hiddenFill>
+            </a:ext>
+          </a:extLst>
+        </p:spPr>
+      </p:pic>
+      <p:sp>
+        <p:nvSpPr>
+          <p:cNvPr id="10" name="TextBox 9"/>
+          <p:cNvSpPr txBox="1"/>
+          <p:nvPr/>
+        </p:nvSpPr>
+        <p:spPr>
+          <a:xfrm>
+            <a:off x="373109" y="3386848"/>
+            <a:ext cx="1107555" cy="307777"/>
+          </a:xfrm>
+          <a:prstGeom prst="rect">
+            <a:avLst/>
+          </a:prstGeom>
+          <a:noFill/>
+        </p:spPr>
+        <p:txBody>
+          <a:bodyPr wrap="square" rtlCol="0">
+            <a:spAutoFit/>
+          </a:bodyPr>
+          <a:lstStyle/>
+          <a:p>
+            <a:r>
+              <a:rPr lang="en-US" sz="1400" smtClean="0"/>
+              <a:t>Instructor</a:t>
+            </a:r>
+            <a:endParaRPr lang="en-US" sz="1400"/>
+          </a:p>
+        </p:txBody>
+      </p:sp>
+      <p:pic>
+        <p:nvPicPr>
+          <p:cNvPr id="12" name="Picture 2" descr="teacher icon"/>
+          <p:cNvPicPr>
+            <a:picLocks noChangeAspect="1" noChangeArrowheads="1"/>
+          </p:cNvPicPr>
+          <p:nvPr/>
+        </p:nvPicPr>
+        <p:blipFill>
+          <a:blip r:embed="rId3" cstate="print">
+            <a:extLst>
+              <a:ext uri="{28A0092B-C50C-407E-A947-70E740481C1C}">
+                <a14:useLocalDpi xmlns:a14="http://schemas.microsoft.com/office/drawing/2010/main" val="0"/>
+              </a:ext>
+            </a:extLst>
+          </a:blip>
+          <a:srcRect/>
+          <a:stretch>
+            <a:fillRect/>
+          </a:stretch>
+        </p:blipFill>
+        <p:spPr bwMode="auto">
+          <a:xfrm>
+            <a:off x="553777" y="2667000"/>
+            <a:ext cx="695902" cy="695902"/>
+          </a:xfrm>
+          <a:prstGeom prst="rect">
+            <a:avLst/>
+          </a:prstGeom>
+          <a:noFill/>
+          <a:extLst>
+            <a:ext uri="{909E8E84-426E-40DD-AFC4-6F175D3DCCD1}">
+              <a14:hiddenFill xmlns:a14="http://schemas.microsoft.com/office/drawing/2010/main">
+                <a:solidFill>
+                  <a:srgbClr val="FFFFFF"/>
+                </a:solidFill>
+              </a14:hiddenFill>
+            </a:ext>
+          </a:extLst>
+        </p:spPr>
+      </p:pic>
+      <p:pic>
+        <p:nvPicPr>
+          <p:cNvPr id="13" name="Picture 2" descr="Smartphone Sony Live with Walkman WT19a 02 icon"/>
+          <p:cNvPicPr>
+            <a:picLocks noChangeAspect="1" noChangeArrowheads="1"/>
+          </p:cNvPicPr>
+          <p:nvPr/>
+        </p:nvPicPr>
+        <p:blipFill>
+          <a:blip r:embed="rId4" cstate="print">
+            <a:extLst>
+              <a:ext uri="{28A0092B-C50C-407E-A947-70E740481C1C}">
+                <a14:useLocalDpi xmlns:a14="http://schemas.microsoft.com/office/drawing/2010/main" val="0"/>
+              </a:ext>
+            </a:extLst>
+          </a:blip>
+          <a:srcRect/>
+          <a:stretch>
+            <a:fillRect/>
+          </a:stretch>
+        </p:blipFill>
+        <p:spPr bwMode="auto">
+          <a:xfrm>
+            <a:off x="2307156" y="2667000"/>
+            <a:ext cx="740968" cy="740968"/>
+          </a:xfrm>
+          <a:prstGeom prst="rect">
+            <a:avLst/>
+          </a:prstGeom>
+          <a:noFill/>
+          <a:extLst>
+            <a:ext uri="{909E8E84-426E-40DD-AFC4-6F175D3DCCD1}">
+              <a14:hiddenFill xmlns:a14="http://schemas.microsoft.com/office/drawing/2010/main">
+                <a:solidFill>
+                  <a:srgbClr val="FFFFFF"/>
+                </a:solidFill>
+              </a14:hiddenFill>
+            </a:ext>
+          </a:extLst>
+        </p:spPr>
+      </p:pic>
+      <p:sp>
+        <p:nvSpPr>
+          <p:cNvPr id="14" name="Right Arrow 13"/>
+          <p:cNvSpPr/>
+          <p:nvPr/>
+        </p:nvSpPr>
+        <p:spPr>
+          <a:xfrm rot="5400000">
+            <a:off x="2208716" y="3922685"/>
+            <a:ext cx="976044" cy="212148"/>
+          </a:xfrm>
+          <a:prstGeom prst="rightArrow">
+            <a:avLst/>
+          </a:prstGeom>
+        </p:spPr>
+        <p:style>
+          <a:lnRef idx="2">
+            <a:schemeClr val="accent1">
+              <a:shade val="50000"/>
+            </a:schemeClr>
+          </a:lnRef>
+          <a:fillRef idx="1">
+            <a:schemeClr val="accent1"/>
+          </a:fillRef>
+          <a:effectRef idx="0">
+            <a:schemeClr val="accent1"/>
+          </a:effectRef>
+          <a:fontRef idx="minor">
+            <a:schemeClr val="lt1"/>
+          </a:fontRef>
+        </p:style>
+        <p:txBody>
+          <a:bodyPr rtlCol="0" anchor="ctr"/>
+          <a:lstStyle/>
+          <a:p>
+            <a:pPr algn="ctr"/>
+            <a:endParaRPr lang="en-US"/>
+          </a:p>
+        </p:txBody>
+      </p:sp>
+      <p:pic>
+        <p:nvPicPr>
+          <p:cNvPr id="15" name="Picture 4" descr="Devices camera photo icon"/>
+          <p:cNvPicPr>
+            <a:picLocks noChangeAspect="1" noChangeArrowheads="1"/>
+          </p:cNvPicPr>
+          <p:nvPr/>
+        </p:nvPicPr>
+        <p:blipFill>
+          <a:blip r:embed="rId5" cstate="print">
+            <a:extLst>
+              <a:ext uri="{28A0092B-C50C-407E-A947-70E740481C1C}">
+                <a14:useLocalDpi xmlns:a14="http://schemas.microsoft.com/office/drawing/2010/main" val="0"/>
+              </a:ext>
+            </a:extLst>
+          </a:blip>
+          <a:srcRect/>
+          <a:stretch>
+            <a:fillRect/>
+          </a:stretch>
+        </p:blipFill>
+        <p:spPr bwMode="auto">
+          <a:xfrm>
+            <a:off x="2057265" y="3930145"/>
+            <a:ext cx="406792" cy="406792"/>
+          </a:xfrm>
+          <a:prstGeom prst="rect">
+            <a:avLst/>
+          </a:prstGeom>
+          <a:noFill/>
+          <a:extLst>
+            <a:ext uri="{909E8E84-426E-40DD-AFC4-6F175D3DCCD1}">
+              <a14:hiddenFill xmlns:a14="http://schemas.microsoft.com/office/drawing/2010/main">
+                <a:solidFill>
+                  <a:srgbClr val="FFFFFF"/>
+                </a:solidFill>
+              </a14:hiddenFill>
+            </a:ext>
+          </a:extLst>
+        </p:spPr>
+      </p:pic>
+      <p:pic>
+        <p:nvPicPr>
+          <p:cNvPr id="16" name="Picture 6" descr="Services icon"/>
+          <p:cNvPicPr>
+            <a:picLocks noChangeAspect="1" noChangeArrowheads="1"/>
+          </p:cNvPicPr>
+          <p:nvPr/>
+        </p:nvPicPr>
+        <p:blipFill>
+          <a:blip r:embed="rId6" cstate="print">
+            <a:extLst>
+              <a:ext uri="{28A0092B-C50C-407E-A947-70E740481C1C}">
+                <a14:useLocalDpi xmlns:a14="http://schemas.microsoft.com/office/drawing/2010/main" val="0"/>
+              </a:ext>
+            </a:extLst>
+          </a:blip>
+          <a:srcRect/>
+          <a:stretch>
+            <a:fillRect/>
+          </a:stretch>
+        </p:blipFill>
+        <p:spPr bwMode="auto">
+          <a:xfrm>
+            <a:off x="4495800" y="4233512"/>
+            <a:ext cx="752201" cy="752201"/>
+          </a:xfrm>
+          <a:prstGeom prst="rect">
+            <a:avLst/>
+          </a:prstGeom>
+          <a:noFill/>
+          <a:extLst>
+            <a:ext uri="{909E8E84-426E-40DD-AFC4-6F175D3DCCD1}">
+              <a14:hiddenFill xmlns:a14="http://schemas.microsoft.com/office/drawing/2010/main">
+                <a:solidFill>
+                  <a:srgbClr val="FFFFFF"/>
+                </a:solidFill>
+              </a14:hiddenFill>
+            </a:ext>
+          </a:extLst>
+        </p:spPr>
+      </p:pic>
+      <p:sp>
+        <p:nvSpPr>
+          <p:cNvPr id="17" name="Up-Down Arrow 16"/>
+          <p:cNvSpPr/>
+          <p:nvPr/>
+        </p:nvSpPr>
+        <p:spPr>
+          <a:xfrm rot="18806735">
+            <a:off x="3627805" y="2769191"/>
+            <a:ext cx="281056" cy="1737758"/>
+          </a:xfrm>
+          <a:prstGeom prst="upDownArrow">
+            <a:avLst/>
+          </a:prstGeom>
+        </p:spPr>
+        <p:style>
+          <a:lnRef idx="2">
+            <a:schemeClr val="accent1">
+              <a:shade val="50000"/>
+            </a:schemeClr>
+          </a:lnRef>
+          <a:fillRef idx="1">
+            <a:schemeClr val="accent1"/>
+          </a:fillRef>
+          <a:effectRef idx="0">
+            <a:schemeClr val="accent1"/>
+          </a:effectRef>
+          <a:fontRef idx="minor">
+            <a:schemeClr val="lt1"/>
+          </a:fontRef>
+        </p:style>
+        <p:txBody>
+          <a:bodyPr rtlCol="0" anchor="ctr"/>
+          <a:lstStyle/>
+          <a:p>
+            <a:pPr algn="ctr"/>
+            <a:endParaRPr lang="en-US"/>
+          </a:p>
+        </p:txBody>
+      </p:sp>
+      <p:pic>
+        <p:nvPicPr>
+          <p:cNvPr id="18" name="Picture 8" descr="antarctic expedition photos icon"/>
+          <p:cNvPicPr>
+            <a:picLocks noChangeAspect="1" noChangeArrowheads="1"/>
+          </p:cNvPicPr>
+          <p:nvPr/>
+        </p:nvPicPr>
+        <p:blipFill>
+          <a:blip r:embed="rId7" cstate="print">
+            <a:extLst>
+              <a:ext uri="{28A0092B-C50C-407E-A947-70E740481C1C}">
+                <a14:useLocalDpi xmlns:a14="http://schemas.microsoft.com/office/drawing/2010/main" val="0"/>
+              </a:ext>
+            </a:extLst>
+          </a:blip>
+          <a:srcRect/>
+          <a:stretch>
+            <a:fillRect/>
+          </a:stretch>
+        </p:blipFill>
+        <p:spPr bwMode="auto">
+          <a:xfrm>
+            <a:off x="3781752" y="3050618"/>
+            <a:ext cx="498340" cy="498340"/>
+          </a:xfrm>
+          <a:prstGeom prst="rect">
+            <a:avLst/>
+          </a:prstGeom>
+          <a:noFill/>
+          <a:extLst>
+            <a:ext uri="{909E8E84-426E-40DD-AFC4-6F175D3DCCD1}">
+              <a14:hiddenFill xmlns:a14="http://schemas.microsoft.com/office/drawing/2010/main">
+                <a:solidFill>
+                  <a:srgbClr val="FFFFFF"/>
+                </a:solidFill>
+              </a14:hiddenFill>
+            </a:ext>
+          </a:extLst>
+        </p:spPr>
+      </p:pic>
+      <p:sp>
+        <p:nvSpPr>
+          <p:cNvPr id="20" name="TextBox 19"/>
+          <p:cNvSpPr txBox="1"/>
+          <p:nvPr/>
+        </p:nvSpPr>
+        <p:spPr>
+          <a:xfrm>
+            <a:off x="2321310" y="5557110"/>
+            <a:ext cx="1107555" cy="307777"/>
+          </a:xfrm>
+          <a:prstGeom prst="rect">
+            <a:avLst/>
+          </a:prstGeom>
+          <a:noFill/>
+        </p:spPr>
+        <p:txBody>
+          <a:bodyPr wrap="square" rtlCol="0">
+            <a:spAutoFit/>
+          </a:bodyPr>
+          <a:lstStyle/>
+          <a:p>
+            <a:r>
+              <a:rPr lang="en-US" sz="1400" smtClean="0"/>
+              <a:t>Students</a:t>
+            </a:r>
+            <a:endParaRPr lang="en-US" sz="1400"/>
+          </a:p>
+        </p:txBody>
+      </p:sp>
+      <p:sp>
+        <p:nvSpPr>
+          <p:cNvPr id="21" name="TextBox 20"/>
+          <p:cNvSpPr txBox="1"/>
+          <p:nvPr/>
+        </p:nvSpPr>
+        <p:spPr>
+          <a:xfrm>
+            <a:off x="4280092" y="5124631"/>
+            <a:ext cx="1447800" cy="307777"/>
+          </a:xfrm>
+          <a:prstGeom prst="rect">
+            <a:avLst/>
+          </a:prstGeom>
+          <a:noFill/>
+        </p:spPr>
+        <p:txBody>
+          <a:bodyPr wrap="square" rtlCol="0">
+            <a:spAutoFit/>
+          </a:bodyPr>
+          <a:lstStyle/>
+          <a:p>
+            <a:r>
+              <a:rPr lang="en-US" sz="1400" smtClean="0"/>
+              <a:t>Web </a:t>
+            </a:r>
+            <a:r>
+              <a:rPr lang="en-US" sz="1400" smtClean="0"/>
+              <a:t>Services</a:t>
+            </a:r>
+            <a:endParaRPr lang="en-US" sz="1400"/>
+          </a:p>
+        </p:txBody>
+      </p:sp>
+      <p:pic>
+        <p:nvPicPr>
+          <p:cNvPr id="22" name="Picture 21"/>
+          <p:cNvPicPr>
+            <a:picLocks noChangeAspect="1"/>
+          </p:cNvPicPr>
+          <p:nvPr/>
+        </p:nvPicPr>
+        <p:blipFill>
+          <a:blip r:embed="rId8">
+            <a:extLst>
+              <a:ext uri="{28A0092B-C50C-407E-A947-70E740481C1C}">
+                <a14:useLocalDpi xmlns:a14="http://schemas.microsoft.com/office/drawing/2010/main" val="0"/>
+              </a:ext>
+            </a:extLst>
+          </a:blip>
+          <a:stretch>
+            <a:fillRect/>
+          </a:stretch>
+        </p:blipFill>
+        <p:spPr>
+          <a:xfrm>
+            <a:off x="7074704" y="4233511"/>
+            <a:ext cx="1040595" cy="1040595"/>
+          </a:xfrm>
+          <a:prstGeom prst="rect">
+            <a:avLst/>
+          </a:prstGeom>
+        </p:spPr>
+      </p:pic>
+      <p:sp>
+        <p:nvSpPr>
+          <p:cNvPr id="23" name="Right Arrow 22"/>
+          <p:cNvSpPr/>
+          <p:nvPr/>
+        </p:nvSpPr>
+        <p:spPr>
+          <a:xfrm>
+            <a:off x="5562600" y="4558741"/>
+            <a:ext cx="1143948" cy="301290"/>
+          </a:xfrm>
+          <a:prstGeom prst="rightArrow">
+            <a:avLst/>
+          </a:prstGeom>
+        </p:spPr>
+        <p:style>
+          <a:lnRef idx="2">
+            <a:schemeClr val="accent1">
+              <a:shade val="50000"/>
+            </a:schemeClr>
+          </a:lnRef>
+          <a:fillRef idx="1">
+            <a:schemeClr val="accent1"/>
+          </a:fillRef>
+          <a:effectRef idx="0">
+            <a:schemeClr val="accent1"/>
+          </a:effectRef>
+          <a:fontRef idx="minor">
+            <a:schemeClr val="lt1"/>
+          </a:fontRef>
+        </p:style>
+        <p:txBody>
+          <a:bodyPr rtlCol="0" anchor="ctr"/>
+          <a:lstStyle/>
+          <a:p>
+            <a:pPr algn="ctr"/>
+            <a:endParaRPr lang="en-US"/>
+          </a:p>
+        </p:txBody>
+      </p:sp>
+      <p:sp>
+        <p:nvSpPr>
+          <p:cNvPr id="24" name="TextBox 23"/>
+          <p:cNvSpPr txBox="1"/>
+          <p:nvPr/>
+        </p:nvSpPr>
+        <p:spPr>
+          <a:xfrm>
+            <a:off x="7162800" y="5277031"/>
+            <a:ext cx="1447800" cy="523220"/>
+          </a:xfrm>
+          <a:prstGeom prst="rect">
+            <a:avLst/>
+          </a:prstGeom>
+          <a:noFill/>
+        </p:spPr>
+        <p:txBody>
+          <a:bodyPr wrap="square" rtlCol="0">
+            <a:spAutoFit/>
+          </a:bodyPr>
+          <a:lstStyle/>
+          <a:p>
+            <a:r>
+              <a:rPr lang="en-US" sz="1400" smtClean="0"/>
+              <a:t>Attendance Checking</a:t>
+            </a:r>
+            <a:endParaRPr lang="en-US" sz="1400"/>
+          </a:p>
+        </p:txBody>
+      </p:sp>
+    </p:spTree>
+    <p:extLst>
+      <p:ext uri="{BB962C8B-B14F-4D97-AF65-F5344CB8AC3E}">
+        <p14:creationId xmlns:p14="http://schemas.microsoft.com/office/powerpoint/2010/main" val="3659779657"/>
+      </p:ext>
+    </p:extLst>
+  </p:cSld>
+  <p:clrMapOvr>
+    <a:masterClrMapping/>
+  </p:clrMapOvr>
+</p:sld>
+</file>
+
+<file path=ppt/slides/slide13.xml><?xml version="1.0" encoding="utf-8"?>
+<p:sld xmlns:a="http://schemas.openxmlformats.org/drawingml/2006/main" xmlns:r="http://schemas.openxmlformats.org/officeDocument/2006/relationships" xmlns:p="http://schemas.openxmlformats.org/presentationml/2006/main">
+  <p:cSld>
+    <p:spTree>
+      <p:nvGrpSpPr>
+        <p:cNvPr id="1" name=""/>
+        <p:cNvGrpSpPr/>
+        <p:nvPr/>
+      </p:nvGrpSpPr>
+      <p:grpSpPr>
+        <a:xfrm>
+          <a:off x="0" y="0"/>
+          <a:ext cx="0" cy="0"/>
+          <a:chOff x="0" y="0"/>
+          <a:chExt cx="0" cy="0"/>
+        </a:xfrm>
+      </p:grpSpPr>
+      <p:sp>
+        <p:nvSpPr>
+          <p:cNvPr id="2" name="Title 1"/>
+          <p:cNvSpPr>
+            <a:spLocks noGrp="1"/>
+          </p:cNvSpPr>
+          <p:nvPr>
+            <p:ph type="title"/>
+          </p:nvPr>
+        </p:nvSpPr>
+        <p:spPr/>
+        <p:txBody>
+          <a:bodyPr/>
+          <a:lstStyle/>
+          <a:p>
+            <a:r>
+              <a:rPr lang="en-US" smtClean="0"/>
+              <a:t>Check Attendance Offline</a:t>
+            </a:r>
+            <a:endParaRPr lang="en-US"/>
+          </a:p>
+        </p:txBody>
+      </p:sp>
+      <p:pic>
+        <p:nvPicPr>
+          <p:cNvPr id="4" name="Content Placeholder 3"/>
+          <p:cNvPicPr>
+            <a:picLocks noGrp="1" noChangeAspect="1"/>
+          </p:cNvPicPr>
+          <p:nvPr>
+            <p:ph idx="1"/>
+          </p:nvPr>
+        </p:nvPicPr>
+        <p:blipFill>
+          <a:blip r:embed="rId2">
+            <a:extLst>
+              <a:ext uri="{28A0092B-C50C-407E-A947-70E740481C1C}">
+                <a14:useLocalDpi xmlns:a14="http://schemas.microsoft.com/office/drawing/2010/main" val="0"/>
+              </a:ext>
+            </a:extLst>
+          </a:blip>
+          <a:stretch>
+            <a:fillRect/>
+          </a:stretch>
+        </p:blipFill>
+        <p:spPr>
+          <a:xfrm>
+            <a:off x="1289144" y="1935163"/>
+            <a:ext cx="6565712" cy="4389437"/>
+          </a:xfrm>
+          <a:prstGeom prst="rect">
+            <a:avLst/>
+          </a:prstGeom>
+        </p:spPr>
+      </p:pic>
+    </p:spTree>
+    <p:extLst>
+      <p:ext uri="{BB962C8B-B14F-4D97-AF65-F5344CB8AC3E}">
+        <p14:creationId xmlns:p14="http://schemas.microsoft.com/office/powerpoint/2010/main" val="3156068639"/>
+      </p:ext>
+    </p:extLst>
+  </p:cSld>
+  <p:clrMapOvr>
+    <a:masterClrMapping/>
+  </p:clrMapOvr>
+</p:sld>
+</file>
+
+<file path=ppt/slides/slide14.xml><?xml version="1.0" encoding="utf-8"?>
+<p:sld xmlns:a="http://schemas.openxmlformats.org/drawingml/2006/main" xmlns:r="http://schemas.openxmlformats.org/officeDocument/2006/relationships" xmlns:p="http://schemas.openxmlformats.org/presentationml/2006/main">
+  <p:cSld>
+    <p:spTree>
+      <p:nvGrpSpPr>
+        <p:cNvPr id="1" name=""/>
+        <p:cNvGrpSpPr/>
+        <p:nvPr/>
+      </p:nvGrpSpPr>
+      <p:grpSpPr>
+        <a:xfrm>
+          <a:off x="0" y="0"/>
+          <a:ext cx="0" cy="0"/>
+          <a:chOff x="0" y="0"/>
+          <a:chExt cx="0" cy="0"/>
+        </a:xfrm>
+      </p:grpSpPr>
+      <p:sp>
+        <p:nvSpPr>
+          <p:cNvPr id="2" name="Title 1"/>
+          <p:cNvSpPr>
+            <a:spLocks noGrp="1"/>
+          </p:cNvSpPr>
+          <p:nvPr>
+            <p:ph type="title"/>
+          </p:nvPr>
+        </p:nvSpPr>
+        <p:spPr/>
+        <p:txBody>
+          <a:bodyPr/>
+          <a:lstStyle/>
+          <a:p>
+            <a:r>
+              <a:rPr lang="en-US" smtClean="0"/>
               <a:t>Advantages</a:t>
             </a:r>
             <a:endParaRPr lang="en-US"/>
@@ -30712,7 +31183,7 @@
 </p:sld>
 </file>
 
-<file path=ppt/slides/slide13.xml><?xml version="1.0" encoding="utf-8"?>
+<file path=ppt/slides/slide15.xml><?xml version="1.0" encoding="utf-8"?>
 <p:sld xmlns:a="http://schemas.openxmlformats.org/drawingml/2006/main" xmlns:r="http://schemas.openxmlformats.org/officeDocument/2006/relationships" xmlns:p="http://schemas.openxmlformats.org/presentationml/2006/main">
   <p:cSld>
     <p:spTree>
@@ -30893,7 +31364,7 @@
 </p:sld>
 </file>
 
-<file path=ppt/slides/slide14.xml><?xml version="1.0" encoding="utf-8"?>
+<file path=ppt/slides/slide16.xml><?xml version="1.0" encoding="utf-8"?>
 <p:sld xmlns:a="http://schemas.openxmlformats.org/drawingml/2006/main" xmlns:r="http://schemas.openxmlformats.org/officeDocument/2006/relationships" xmlns:p="http://schemas.openxmlformats.org/presentationml/2006/main">
   <p:cSld>
     <p:spTree>
@@ -31111,7 +31582,7 @@
 </p:sld>
 </file>
 
-<file path=ppt/slides/slide15.xml><?xml version="1.0" encoding="utf-8"?>
+<file path=ppt/slides/slide17.xml><?xml version="1.0" encoding="utf-8"?>
 <p:sld xmlns:a="http://schemas.openxmlformats.org/drawingml/2006/main" xmlns:r="http://schemas.openxmlformats.org/officeDocument/2006/relationships" xmlns:p="http://schemas.openxmlformats.org/presentationml/2006/main">
   <p:cSld>
     <p:spTree>
@@ -35813,7 +36284,7 @@
         <p:spPr>
           <a:xfrm>
             <a:off x="3352800" y="6117728"/>
-            <a:ext cx="1107555" cy="307777"/>
+            <a:ext cx="1447800" cy="307777"/>
           </a:xfrm>
           <a:prstGeom prst="rect">
             <a:avLst/>
@@ -35826,6 +36297,10 @@
           </a:bodyPr>
           <a:lstStyle/>
           <a:p>
+            <a:r>
+              <a:rPr lang="en-US" sz="1400" smtClean="0"/>
+              <a:t>Web </a:t>
+            </a:r>
             <a:r>
               <a:rPr lang="en-US" sz="1400" smtClean="0"/>
               <a:t>Services</a:t>

</xml_diff>